<commit_message>
- store 6 images using the current parameters defined in simulation.py - add a tests/image.py program to display the 6 example images
</commit_message>
<xml_diff>
--- a/images/20170120 Spark et LSST.pptx
+++ b/images/20170120 Spark et LSST.pptx
@@ -11,6 +11,12 @@
     <p:sldId id="263" r:id="rId5"/>
     <p:sldId id="266" r:id="rId6"/>
     <p:sldId id="267" r:id="rId7"/>
+    <p:sldId id="268" r:id="rId8"/>
+    <p:sldId id="273" r:id="rId9"/>
+    <p:sldId id="272" r:id="rId10"/>
+    <p:sldId id="269" r:id="rId11"/>
+    <p:sldId id="270" r:id="rId12"/>
+    <p:sldId id="271" r:id="rId13"/>
   </p:sldIdLst>
   <p:sldSz cx="9144000" cy="6858000" type="screen4x3"/>
   <p:notesSz cx="6858000" cy="9144000"/>
@@ -293,7 +299,7 @@
           <a:p>
             <a:fld id="{86B6C451-13DA-4D9F-AE7F-9788E91ABC15}" type="datetimeFigureOut">
               <a:rPr lang="fr-FR" smtClean="0"/>
-              <a:t>20/02/2017</a:t>
+              <a:t>01/03/2017</a:t>
             </a:fld>
             <a:endParaRPr lang="fr-FR"/>
           </a:p>
@@ -463,7 +469,7 @@
           <a:p>
             <a:fld id="{86B6C451-13DA-4D9F-AE7F-9788E91ABC15}" type="datetimeFigureOut">
               <a:rPr lang="fr-FR" smtClean="0"/>
-              <a:t>20/02/2017</a:t>
+              <a:t>01/03/2017</a:t>
             </a:fld>
             <a:endParaRPr lang="fr-FR"/>
           </a:p>
@@ -643,7 +649,7 @@
           <a:p>
             <a:fld id="{86B6C451-13DA-4D9F-AE7F-9788E91ABC15}" type="datetimeFigureOut">
               <a:rPr lang="fr-FR" smtClean="0"/>
-              <a:t>20/02/2017</a:t>
+              <a:t>01/03/2017</a:t>
             </a:fld>
             <a:endParaRPr lang="fr-FR"/>
           </a:p>
@@ -859,7 +865,7 @@
           <a:p>
             <a:fld id="{86B6C451-13DA-4D9F-AE7F-9788E91ABC15}" type="datetimeFigureOut">
               <a:rPr lang="fr-FR" smtClean="0"/>
-              <a:t>20/02/2017</a:t>
+              <a:t>01/03/2017</a:t>
             </a:fld>
             <a:endParaRPr lang="fr-FR"/>
           </a:p>
@@ -1105,7 +1111,7 @@
           <a:p>
             <a:fld id="{86B6C451-13DA-4D9F-AE7F-9788E91ABC15}" type="datetimeFigureOut">
               <a:rPr lang="fr-FR" smtClean="0"/>
-              <a:t>20/02/2017</a:t>
+              <a:t>01/03/2017</a:t>
             </a:fld>
             <a:endParaRPr lang="fr-FR"/>
           </a:p>
@@ -1393,7 +1399,7 @@
           <a:p>
             <a:fld id="{86B6C451-13DA-4D9F-AE7F-9788E91ABC15}" type="datetimeFigureOut">
               <a:rPr lang="fr-FR" smtClean="0"/>
-              <a:t>20/02/2017</a:t>
+              <a:t>01/03/2017</a:t>
             </a:fld>
             <a:endParaRPr lang="fr-FR"/>
           </a:p>
@@ -1815,7 +1821,7 @@
           <a:p>
             <a:fld id="{86B6C451-13DA-4D9F-AE7F-9788E91ABC15}" type="datetimeFigureOut">
               <a:rPr lang="fr-FR" smtClean="0"/>
-              <a:t>20/02/2017</a:t>
+              <a:t>01/03/2017</a:t>
             </a:fld>
             <a:endParaRPr lang="fr-FR"/>
           </a:p>
@@ -1933,7 +1939,7 @@
           <a:p>
             <a:fld id="{86B6C451-13DA-4D9F-AE7F-9788E91ABC15}" type="datetimeFigureOut">
               <a:rPr lang="fr-FR" smtClean="0"/>
-              <a:t>20/02/2017</a:t>
+              <a:t>01/03/2017</a:t>
             </a:fld>
             <a:endParaRPr lang="fr-FR"/>
           </a:p>
@@ -2028,7 +2034,7 @@
           <a:p>
             <a:fld id="{86B6C451-13DA-4D9F-AE7F-9788E91ABC15}" type="datetimeFigureOut">
               <a:rPr lang="fr-FR" smtClean="0"/>
-              <a:t>20/02/2017</a:t>
+              <a:t>01/03/2017</a:t>
             </a:fld>
             <a:endParaRPr lang="fr-FR"/>
           </a:p>
@@ -2305,7 +2311,7 @@
           <a:p>
             <a:fld id="{86B6C451-13DA-4D9F-AE7F-9788E91ABC15}" type="datetimeFigureOut">
               <a:rPr lang="fr-FR" smtClean="0"/>
-              <a:t>20/02/2017</a:t>
+              <a:t>01/03/2017</a:t>
             </a:fld>
             <a:endParaRPr lang="fr-FR"/>
           </a:p>
@@ -2558,7 +2564,7 @@
           <a:p>
             <a:fld id="{86B6C451-13DA-4D9F-AE7F-9788E91ABC15}" type="datetimeFigureOut">
               <a:rPr lang="fr-FR" smtClean="0"/>
-              <a:t>20/02/2017</a:t>
+              <a:t>01/03/2017</a:t>
             </a:fld>
             <a:endParaRPr lang="fr-FR"/>
           </a:p>
@@ -2771,7 +2777,7 @@
           <a:p>
             <a:fld id="{86B6C451-13DA-4D9F-AE7F-9788E91ABC15}" type="datetimeFigureOut">
               <a:rPr lang="fr-FR" smtClean="0"/>
-              <a:t>20/02/2017</a:t>
+              <a:t>01/03/2017</a:t>
             </a:fld>
             <a:endParaRPr lang="fr-FR"/>
           </a:p>
@@ -3206,6 +3212,2564 @@
   <p:clrMapOvr>
     <a:masterClrMapping/>
   </p:clrMapOvr>
+  <p:timing>
+    <p:tnLst>
+      <p:par>
+        <p:cTn id="1" dur="indefinite" restart="never" nodeType="tmRoot"/>
+      </p:par>
+    </p:tnLst>
+  </p:timing>
+</p:sld>
+</file>
+
+<file path=ppt/slides/slide10.xml><?xml version="1.0" encoding="utf-8"?>
+<p:sld xmlns:a="http://schemas.openxmlformats.org/drawingml/2006/main" xmlns:r="http://schemas.openxmlformats.org/officeDocument/2006/relationships" xmlns:p="http://schemas.openxmlformats.org/presentationml/2006/main">
+  <p:cSld>
+    <p:spTree>
+      <p:nvGrpSpPr>
+        <p:cNvPr id="1" name=""/>
+        <p:cNvGrpSpPr/>
+        <p:nvPr/>
+      </p:nvGrpSpPr>
+      <p:grpSpPr>
+        <a:xfrm>
+          <a:off x="0" y="0"/>
+          <a:ext cx="0" cy="0"/>
+          <a:chOff x="0" y="0"/>
+          <a:chExt cx="0" cy="0"/>
+        </a:xfrm>
+      </p:grpSpPr>
+      <p:sp>
+        <p:nvSpPr>
+          <p:cNvPr id="2" name="Titre 1"/>
+          <p:cNvSpPr>
+            <a:spLocks noGrp="1"/>
+          </p:cNvSpPr>
+          <p:nvPr>
+            <p:ph type="title"/>
+          </p:nvPr>
+        </p:nvSpPr>
+        <p:spPr/>
+        <p:txBody>
+          <a:bodyPr>
+            <a:normAutofit fontScale="90000"/>
+          </a:bodyPr>
+          <a:lstStyle/>
+          <a:p>
+            <a:r>
+              <a:rPr lang="fr-FR" dirty="0" smtClean="0"/>
+              <a:t>Création des images</a:t>
+            </a:r>
+            <a:endParaRPr lang="fr-FR" dirty="0"/>
+          </a:p>
+        </p:txBody>
+      </p:sp>
+      <p:sp>
+        <p:nvSpPr>
+          <p:cNvPr id="6" name="ZoneTexte 5"/>
+          <p:cNvSpPr txBox="1"/>
+          <p:nvPr/>
+        </p:nvSpPr>
+        <p:spPr>
+          <a:xfrm>
+            <a:off x="179512" y="1052736"/>
+            <a:ext cx="6785832" cy="1569660"/>
+          </a:xfrm>
+          <a:prstGeom prst="rect">
+            <a:avLst/>
+          </a:prstGeom>
+          <a:solidFill>
+            <a:schemeClr val="accent3">
+              <a:lumMod val="20000"/>
+              <a:lumOff val="80000"/>
+            </a:schemeClr>
+          </a:solidFill>
+          <a:ln>
+            <a:solidFill>
+              <a:srgbClr val="0070C0"/>
+            </a:solidFill>
+          </a:ln>
+        </p:spPr>
+        <p:txBody>
+          <a:bodyPr wrap="none" rtlCol="0">
+            <a:spAutoFit/>
+          </a:bodyPr>
+          <a:lstStyle/>
+          <a:p>
+            <a:r>
+              <a:rPr lang="fr-FR" sz="1200" dirty="0" err="1" smtClean="0">
+                <a:latin typeface="Courier New" panose="02070309020205020404" pitchFamily="49" charset="0"/>
+                <a:cs typeface="Courier New" panose="02070309020205020404" pitchFamily="49" charset="0"/>
+              </a:rPr>
+              <a:t>def</a:t>
+            </a:r>
+            <a:r>
+              <a:rPr lang="fr-FR" sz="1200" dirty="0" smtClean="0">
+                <a:latin typeface="Courier New" panose="02070309020205020404" pitchFamily="49" charset="0"/>
+                <a:cs typeface="Courier New" panose="02070309020205020404" pitchFamily="49" charset="0"/>
+              </a:rPr>
+              <a:t> </a:t>
+            </a:r>
+            <a:r>
+              <a:rPr lang="fr-FR" sz="1200" dirty="0" err="1" smtClean="0">
+                <a:latin typeface="Courier New" panose="02070309020205020404" pitchFamily="49" charset="0"/>
+                <a:cs typeface="Courier New" panose="02070309020205020404" pitchFamily="49" charset="0"/>
+              </a:rPr>
+              <a:t>make_schema</a:t>
+            </a:r>
+            <a:r>
+              <a:rPr lang="fr-FR" sz="1200" dirty="0" smtClean="0">
+                <a:latin typeface="Courier New" panose="02070309020205020404" pitchFamily="49" charset="0"/>
+                <a:cs typeface="Courier New" panose="02070309020205020404" pitchFamily="49" charset="0"/>
+              </a:rPr>
+              <a:t>():</a:t>
+            </a:r>
+          </a:p>
+          <a:p>
+            <a:r>
+              <a:rPr lang="fr-FR" sz="1200" dirty="0" smtClean="0">
+                <a:latin typeface="Courier New" panose="02070309020205020404" pitchFamily="49" charset="0"/>
+                <a:cs typeface="Courier New" panose="02070309020205020404" pitchFamily="49" charset="0"/>
+              </a:rPr>
+              <a:t>    </a:t>
+            </a:r>
+            <a:r>
+              <a:rPr lang="fr-FR" sz="1200" dirty="0" err="1" smtClean="0">
+                <a:latin typeface="Courier New" panose="02070309020205020404" pitchFamily="49" charset="0"/>
+                <a:cs typeface="Courier New" panose="02070309020205020404" pitchFamily="49" charset="0"/>
+              </a:rPr>
+              <a:t>schema</a:t>
+            </a:r>
+            <a:r>
+              <a:rPr lang="fr-FR" sz="1200" dirty="0" smtClean="0">
+                <a:latin typeface="Courier New" panose="02070309020205020404" pitchFamily="49" charset="0"/>
+                <a:cs typeface="Courier New" panose="02070309020205020404" pitchFamily="49" charset="0"/>
+              </a:rPr>
+              <a:t> </a:t>
+            </a:r>
+            <a:r>
+              <a:rPr lang="fr-FR" sz="1200" dirty="0">
+                <a:latin typeface="Courier New" panose="02070309020205020404" pitchFamily="49" charset="0"/>
+                <a:cs typeface="Courier New" panose="02070309020205020404" pitchFamily="49" charset="0"/>
+              </a:rPr>
+              <a:t>= </a:t>
+            </a:r>
+            <a:r>
+              <a:rPr lang="fr-FR" sz="1200" dirty="0" err="1">
+                <a:latin typeface="Courier New" panose="02070309020205020404" pitchFamily="49" charset="0"/>
+                <a:cs typeface="Courier New" panose="02070309020205020404" pitchFamily="49" charset="0"/>
+              </a:rPr>
+              <a:t>StructType</a:t>
+            </a:r>
+            <a:r>
+              <a:rPr lang="fr-FR" sz="1200" dirty="0">
+                <a:latin typeface="Courier New" panose="02070309020205020404" pitchFamily="49" charset="0"/>
+                <a:cs typeface="Courier New" panose="02070309020205020404" pitchFamily="49" charset="0"/>
+              </a:rPr>
+              <a:t>([</a:t>
+            </a:r>
+          </a:p>
+          <a:p>
+            <a:r>
+              <a:rPr lang="fr-FR" sz="1200" dirty="0">
+                <a:latin typeface="Courier New" panose="02070309020205020404" pitchFamily="49" charset="0"/>
+                <a:cs typeface="Courier New" panose="02070309020205020404" pitchFamily="49" charset="0"/>
+              </a:rPr>
+              <a:t>       </a:t>
+            </a:r>
+            <a:r>
+              <a:rPr lang="fr-FR" sz="1200" dirty="0" err="1">
+                <a:latin typeface="Courier New" panose="02070309020205020404" pitchFamily="49" charset="0"/>
+                <a:cs typeface="Courier New" panose="02070309020205020404" pitchFamily="49" charset="0"/>
+              </a:rPr>
+              <a:t>StructField</a:t>
+            </a:r>
+            <a:r>
+              <a:rPr lang="fr-FR" sz="1200" dirty="0">
+                <a:latin typeface="Courier New" panose="02070309020205020404" pitchFamily="49" charset="0"/>
+                <a:cs typeface="Courier New" panose="02070309020205020404" pitchFamily="49" charset="0"/>
+              </a:rPr>
+              <a:t>("id", </a:t>
+            </a:r>
+            <a:r>
+              <a:rPr lang="fr-FR" sz="1200" dirty="0" err="1">
+                <a:latin typeface="Courier New" panose="02070309020205020404" pitchFamily="49" charset="0"/>
+                <a:cs typeface="Courier New" panose="02070309020205020404" pitchFamily="49" charset="0"/>
+              </a:rPr>
+              <a:t>IntegerType</a:t>
+            </a:r>
+            <a:r>
+              <a:rPr lang="fr-FR" sz="1200" dirty="0">
+                <a:latin typeface="Courier New" panose="02070309020205020404" pitchFamily="49" charset="0"/>
+                <a:cs typeface="Courier New" panose="02070309020205020404" pitchFamily="49" charset="0"/>
+              </a:rPr>
+              <a:t>(), </a:t>
+            </a:r>
+            <a:r>
+              <a:rPr lang="fr-FR" sz="1200" dirty="0" err="1">
+                <a:latin typeface="Courier New" panose="02070309020205020404" pitchFamily="49" charset="0"/>
+                <a:cs typeface="Courier New" panose="02070309020205020404" pitchFamily="49" charset="0"/>
+              </a:rPr>
+              <a:t>True</a:t>
+            </a:r>
+            <a:r>
+              <a:rPr lang="fr-FR" sz="1200" dirty="0">
+                <a:latin typeface="Courier New" panose="02070309020205020404" pitchFamily="49" charset="0"/>
+                <a:cs typeface="Courier New" panose="02070309020205020404" pitchFamily="49" charset="0"/>
+              </a:rPr>
+              <a:t>),</a:t>
+            </a:r>
+            <a:br>
+              <a:rPr lang="fr-FR" sz="1200" dirty="0">
+                <a:latin typeface="Courier New" panose="02070309020205020404" pitchFamily="49" charset="0"/>
+                <a:cs typeface="Courier New" panose="02070309020205020404" pitchFamily="49" charset="0"/>
+              </a:rPr>
+            </a:br>
+            <a:r>
+              <a:rPr lang="fr-FR" sz="1200" dirty="0">
+                <a:latin typeface="Courier New" panose="02070309020205020404" pitchFamily="49" charset="0"/>
+                <a:cs typeface="Courier New" panose="02070309020205020404" pitchFamily="49" charset="0"/>
+              </a:rPr>
+              <a:t>       </a:t>
+            </a:r>
+            <a:r>
+              <a:rPr lang="fr-FR" sz="1200" dirty="0" err="1">
+                <a:latin typeface="Courier New" panose="02070309020205020404" pitchFamily="49" charset="0"/>
+                <a:cs typeface="Courier New" panose="02070309020205020404" pitchFamily="49" charset="0"/>
+              </a:rPr>
+              <a:t>StructField</a:t>
+            </a:r>
+            <a:r>
+              <a:rPr lang="fr-FR" sz="1200" dirty="0">
+                <a:latin typeface="Courier New" panose="02070309020205020404" pitchFamily="49" charset="0"/>
+                <a:cs typeface="Courier New" panose="02070309020205020404" pitchFamily="49" charset="0"/>
+              </a:rPr>
+              <a:t>("ra", </a:t>
+            </a:r>
+            <a:r>
+              <a:rPr lang="fr-FR" sz="1200" dirty="0" err="1">
+                <a:latin typeface="Courier New" panose="02070309020205020404" pitchFamily="49" charset="0"/>
+                <a:cs typeface="Courier New" panose="02070309020205020404" pitchFamily="49" charset="0"/>
+              </a:rPr>
+              <a:t>DoubleType</a:t>
+            </a:r>
+            <a:r>
+              <a:rPr lang="fr-FR" sz="1200" dirty="0">
+                <a:latin typeface="Courier New" panose="02070309020205020404" pitchFamily="49" charset="0"/>
+                <a:cs typeface="Courier New" panose="02070309020205020404" pitchFamily="49" charset="0"/>
+              </a:rPr>
+              <a:t>(), </a:t>
+            </a:r>
+            <a:r>
+              <a:rPr lang="fr-FR" sz="1200" dirty="0" err="1">
+                <a:latin typeface="Courier New" panose="02070309020205020404" pitchFamily="49" charset="0"/>
+                <a:cs typeface="Courier New" panose="02070309020205020404" pitchFamily="49" charset="0"/>
+              </a:rPr>
+              <a:t>True</a:t>
+            </a:r>
+            <a:r>
+              <a:rPr lang="fr-FR" sz="1200" dirty="0">
+                <a:latin typeface="Courier New" panose="02070309020205020404" pitchFamily="49" charset="0"/>
+                <a:cs typeface="Courier New" panose="02070309020205020404" pitchFamily="49" charset="0"/>
+              </a:rPr>
+              <a:t>),</a:t>
+            </a:r>
+            <a:br>
+              <a:rPr lang="fr-FR" sz="1200" dirty="0">
+                <a:latin typeface="Courier New" panose="02070309020205020404" pitchFamily="49" charset="0"/>
+                <a:cs typeface="Courier New" panose="02070309020205020404" pitchFamily="49" charset="0"/>
+              </a:rPr>
+            </a:br>
+            <a:r>
+              <a:rPr lang="fr-FR" sz="1200" dirty="0">
+                <a:latin typeface="Courier New" panose="02070309020205020404" pitchFamily="49" charset="0"/>
+                <a:cs typeface="Courier New" panose="02070309020205020404" pitchFamily="49" charset="0"/>
+              </a:rPr>
+              <a:t>       </a:t>
+            </a:r>
+            <a:r>
+              <a:rPr lang="fr-FR" sz="1200" dirty="0" err="1">
+                <a:latin typeface="Courier New" panose="02070309020205020404" pitchFamily="49" charset="0"/>
+                <a:cs typeface="Courier New" panose="02070309020205020404" pitchFamily="49" charset="0"/>
+              </a:rPr>
+              <a:t>StructField</a:t>
+            </a:r>
+            <a:r>
+              <a:rPr lang="fr-FR" sz="1200" dirty="0">
+                <a:latin typeface="Courier New" panose="02070309020205020404" pitchFamily="49" charset="0"/>
+                <a:cs typeface="Courier New" panose="02070309020205020404" pitchFamily="49" charset="0"/>
+              </a:rPr>
+              <a:t>("</a:t>
+            </a:r>
+            <a:r>
+              <a:rPr lang="fr-FR" sz="1200" dirty="0" err="1">
+                <a:latin typeface="Courier New" panose="02070309020205020404" pitchFamily="49" charset="0"/>
+                <a:cs typeface="Courier New" panose="02070309020205020404" pitchFamily="49" charset="0"/>
+              </a:rPr>
+              <a:t>dec</a:t>
+            </a:r>
+            <a:r>
+              <a:rPr lang="fr-FR" sz="1200" dirty="0">
+                <a:latin typeface="Courier New" panose="02070309020205020404" pitchFamily="49" charset="0"/>
+                <a:cs typeface="Courier New" panose="02070309020205020404" pitchFamily="49" charset="0"/>
+              </a:rPr>
+              <a:t>", </a:t>
+            </a:r>
+            <a:r>
+              <a:rPr lang="fr-FR" sz="1200" dirty="0" err="1">
+                <a:latin typeface="Courier New" panose="02070309020205020404" pitchFamily="49" charset="0"/>
+                <a:cs typeface="Courier New" panose="02070309020205020404" pitchFamily="49" charset="0"/>
+              </a:rPr>
+              <a:t>DoubleType</a:t>
+            </a:r>
+            <a:r>
+              <a:rPr lang="fr-FR" sz="1200" dirty="0">
+                <a:latin typeface="Courier New" panose="02070309020205020404" pitchFamily="49" charset="0"/>
+                <a:cs typeface="Courier New" panose="02070309020205020404" pitchFamily="49" charset="0"/>
+              </a:rPr>
+              <a:t>(), </a:t>
+            </a:r>
+            <a:r>
+              <a:rPr lang="fr-FR" sz="1200" dirty="0" err="1">
+                <a:latin typeface="Courier New" panose="02070309020205020404" pitchFamily="49" charset="0"/>
+                <a:cs typeface="Courier New" panose="02070309020205020404" pitchFamily="49" charset="0"/>
+              </a:rPr>
+              <a:t>True</a:t>
+            </a:r>
+            <a:r>
+              <a:rPr lang="fr-FR" sz="1200" dirty="0">
+                <a:latin typeface="Courier New" panose="02070309020205020404" pitchFamily="49" charset="0"/>
+                <a:cs typeface="Courier New" panose="02070309020205020404" pitchFamily="49" charset="0"/>
+              </a:rPr>
+              <a:t>),</a:t>
+            </a:r>
+            <a:br>
+              <a:rPr lang="fr-FR" sz="1200" dirty="0">
+                <a:latin typeface="Courier New" panose="02070309020205020404" pitchFamily="49" charset="0"/>
+                <a:cs typeface="Courier New" panose="02070309020205020404" pitchFamily="49" charset="0"/>
+              </a:rPr>
+            </a:br>
+            <a:r>
+              <a:rPr lang="fr-FR" sz="1200" dirty="0">
+                <a:latin typeface="Courier New" panose="02070309020205020404" pitchFamily="49" charset="0"/>
+                <a:cs typeface="Courier New" panose="02070309020205020404" pitchFamily="49" charset="0"/>
+              </a:rPr>
+              <a:t>       </a:t>
+            </a:r>
+            <a:r>
+              <a:rPr lang="fr-FR" sz="1200" dirty="0" err="1">
+                <a:latin typeface="Courier New" panose="02070309020205020404" pitchFamily="49" charset="0"/>
+                <a:cs typeface="Courier New" panose="02070309020205020404" pitchFamily="49" charset="0"/>
+              </a:rPr>
+              <a:t>StructField</a:t>
+            </a:r>
+            <a:r>
+              <a:rPr lang="fr-FR" sz="1200" dirty="0">
+                <a:latin typeface="Courier New" panose="02070309020205020404" pitchFamily="49" charset="0"/>
+                <a:cs typeface="Courier New" panose="02070309020205020404" pitchFamily="49" charset="0"/>
+              </a:rPr>
+              <a:t>("image", </a:t>
+            </a:r>
+            <a:r>
+              <a:rPr lang="fr-FR" sz="1200" dirty="0" err="1">
+                <a:latin typeface="Courier New" panose="02070309020205020404" pitchFamily="49" charset="0"/>
+                <a:cs typeface="Courier New" panose="02070309020205020404" pitchFamily="49" charset="0"/>
+              </a:rPr>
+              <a:t>ArrayType</a:t>
+            </a:r>
+            <a:r>
+              <a:rPr lang="fr-FR" sz="1200" dirty="0">
+                <a:latin typeface="Courier New" panose="02070309020205020404" pitchFamily="49" charset="0"/>
+                <a:cs typeface="Courier New" panose="02070309020205020404" pitchFamily="49" charset="0"/>
+              </a:rPr>
+              <a:t>(</a:t>
+            </a:r>
+            <a:r>
+              <a:rPr lang="fr-FR" sz="1200" dirty="0" err="1">
+                <a:latin typeface="Courier New" panose="02070309020205020404" pitchFamily="49" charset="0"/>
+                <a:cs typeface="Courier New" panose="02070309020205020404" pitchFamily="49" charset="0"/>
+              </a:rPr>
+              <a:t>ArrayType</a:t>
+            </a:r>
+            <a:r>
+              <a:rPr lang="fr-FR" sz="1200" dirty="0">
+                <a:latin typeface="Courier New" panose="02070309020205020404" pitchFamily="49" charset="0"/>
+                <a:cs typeface="Courier New" panose="02070309020205020404" pitchFamily="49" charset="0"/>
+              </a:rPr>
+              <a:t>(</a:t>
+            </a:r>
+            <a:r>
+              <a:rPr lang="fr-FR" sz="1200" dirty="0" err="1">
+                <a:latin typeface="Courier New" panose="02070309020205020404" pitchFamily="49" charset="0"/>
+                <a:cs typeface="Courier New" panose="02070309020205020404" pitchFamily="49" charset="0"/>
+              </a:rPr>
+              <a:t>DoubleType</a:t>
+            </a:r>
+            <a:r>
+              <a:rPr lang="fr-FR" sz="1200" dirty="0">
+                <a:latin typeface="Courier New" panose="02070309020205020404" pitchFamily="49" charset="0"/>
+                <a:cs typeface="Courier New" panose="02070309020205020404" pitchFamily="49" charset="0"/>
+              </a:rPr>
+              <a:t>()), </a:t>
+            </a:r>
+            <a:r>
+              <a:rPr lang="fr-FR" sz="1200" dirty="0" err="1">
+                <a:latin typeface="Courier New" panose="02070309020205020404" pitchFamily="49" charset="0"/>
+                <a:cs typeface="Courier New" panose="02070309020205020404" pitchFamily="49" charset="0"/>
+              </a:rPr>
+              <a:t>True</a:t>
+            </a:r>
+            <a:r>
+              <a:rPr lang="fr-FR" sz="1200" dirty="0" smtClean="0">
+                <a:latin typeface="Courier New" panose="02070309020205020404" pitchFamily="49" charset="0"/>
+                <a:cs typeface="Courier New" panose="02070309020205020404" pitchFamily="49" charset="0"/>
+              </a:rPr>
+              <a:t>))])</a:t>
+            </a:r>
+          </a:p>
+          <a:p>
+            <a:endParaRPr lang="fr-FR" sz="1200" dirty="0">
+              <a:latin typeface="Courier New" panose="02070309020205020404" pitchFamily="49" charset="0"/>
+              <a:cs typeface="Courier New" panose="02070309020205020404" pitchFamily="49" charset="0"/>
+            </a:endParaRPr>
+          </a:p>
+          <a:p>
+            <a:r>
+              <a:rPr lang="fr-FR" sz="1200" dirty="0" smtClean="0">
+                <a:latin typeface="Courier New" panose="02070309020205020404" pitchFamily="49" charset="0"/>
+                <a:cs typeface="Courier New" panose="02070309020205020404" pitchFamily="49" charset="0"/>
+              </a:rPr>
+              <a:t>    return </a:t>
+            </a:r>
+            <a:r>
+              <a:rPr lang="fr-FR" sz="1200" dirty="0" err="1" smtClean="0">
+                <a:latin typeface="Courier New" panose="02070309020205020404" pitchFamily="49" charset="0"/>
+                <a:cs typeface="Courier New" panose="02070309020205020404" pitchFamily="49" charset="0"/>
+              </a:rPr>
+              <a:t>schema</a:t>
+            </a:r>
+            <a:endParaRPr lang="fr-FR" sz="1200" dirty="0" smtClean="0">
+              <a:latin typeface="Courier New" panose="02070309020205020404" pitchFamily="49" charset="0"/>
+              <a:cs typeface="Courier New" panose="02070309020205020404" pitchFamily="49" charset="0"/>
+            </a:endParaRPr>
+          </a:p>
+        </p:txBody>
+      </p:sp>
+      <p:sp>
+        <p:nvSpPr>
+          <p:cNvPr id="4" name="ZoneTexte 3"/>
+          <p:cNvSpPr txBox="1"/>
+          <p:nvPr/>
+        </p:nvSpPr>
+        <p:spPr>
+          <a:xfrm>
+            <a:off x="486902" y="2852350"/>
+            <a:ext cx="7901522" cy="3231654"/>
+          </a:xfrm>
+          <a:prstGeom prst="rect">
+            <a:avLst/>
+          </a:prstGeom>
+          <a:solidFill>
+            <a:schemeClr val="bg1">
+              <a:lumMod val="95000"/>
+            </a:schemeClr>
+          </a:solidFill>
+          <a:ln>
+            <a:solidFill>
+              <a:srgbClr val="0070C0"/>
+            </a:solidFill>
+          </a:ln>
+        </p:spPr>
+        <p:txBody>
+          <a:bodyPr wrap="none" rtlCol="0">
+            <a:spAutoFit/>
+          </a:bodyPr>
+          <a:lstStyle/>
+          <a:p>
+            <a:r>
+              <a:rPr lang="fr-FR" sz="1200" dirty="0" err="1" smtClean="0">
+                <a:latin typeface="Courier New" panose="02070309020205020404" pitchFamily="49" charset="0"/>
+                <a:cs typeface="Courier New" panose="02070309020205020404" pitchFamily="49" charset="0"/>
+              </a:rPr>
+              <a:t>def</a:t>
+            </a:r>
+            <a:r>
+              <a:rPr lang="fr-FR" sz="1200" dirty="0" smtClean="0">
+                <a:latin typeface="Courier New" panose="02070309020205020404" pitchFamily="49" charset="0"/>
+                <a:cs typeface="Courier New" panose="02070309020205020404" pitchFamily="49" charset="0"/>
+              </a:rPr>
+              <a:t> </a:t>
+            </a:r>
+            <a:r>
+              <a:rPr lang="fr-FR" sz="1200" dirty="0" err="1" smtClean="0">
+                <a:latin typeface="Courier New" panose="02070309020205020404" pitchFamily="49" charset="0"/>
+                <a:cs typeface="Courier New" panose="02070309020205020404" pitchFamily="49" charset="0"/>
+              </a:rPr>
+              <a:t>create_image</a:t>
+            </a:r>
+            <a:r>
+              <a:rPr lang="fr-FR" sz="1200" dirty="0" smtClean="0">
+                <a:latin typeface="Courier New" panose="02070309020205020404" pitchFamily="49" charset="0"/>
+                <a:cs typeface="Courier New" panose="02070309020205020404" pitchFamily="49" charset="0"/>
+              </a:rPr>
+              <a:t>(</a:t>
+            </a:r>
+            <a:r>
+              <a:rPr lang="fr-FR" sz="1200" dirty="0" err="1" smtClean="0">
+                <a:latin typeface="Courier New" panose="02070309020205020404" pitchFamily="49" charset="0"/>
+                <a:cs typeface="Courier New" panose="02070309020205020404" pitchFamily="49" charset="0"/>
+              </a:rPr>
+              <a:t>spark</a:t>
+            </a:r>
+            <a:r>
+              <a:rPr lang="fr-FR" sz="1200" dirty="0" smtClean="0">
+                <a:latin typeface="Courier New" panose="02070309020205020404" pitchFamily="49" charset="0"/>
+                <a:cs typeface="Courier New" panose="02070309020205020404" pitchFamily="49" charset="0"/>
+              </a:rPr>
+              <a:t>):</a:t>
+            </a:r>
+          </a:p>
+          <a:p>
+            <a:r>
+              <a:rPr lang="fr-FR" sz="1200" dirty="0">
+                <a:latin typeface="Courier New" panose="02070309020205020404" pitchFamily="49" charset="0"/>
+                <a:cs typeface="Courier New" panose="02070309020205020404" pitchFamily="49" charset="0"/>
+              </a:rPr>
+              <a:t>    </a:t>
+            </a:r>
+            <a:r>
+              <a:rPr lang="fr-FR" sz="1200" dirty="0" err="1">
+                <a:latin typeface="Courier New" panose="02070309020205020404" pitchFamily="49" charset="0"/>
+                <a:cs typeface="Courier New" panose="02070309020205020404" pitchFamily="49" charset="0"/>
+              </a:rPr>
+              <a:t>rows</a:t>
+            </a:r>
+            <a:r>
+              <a:rPr lang="fr-FR" sz="1200" dirty="0">
+                <a:latin typeface="Courier New" panose="02070309020205020404" pitchFamily="49" charset="0"/>
+                <a:cs typeface="Courier New" panose="02070309020205020404" pitchFamily="49" charset="0"/>
+              </a:rPr>
+              <a:t> = </a:t>
+            </a:r>
+            <a:r>
+              <a:rPr lang="fr-FR" sz="1200" dirty="0" smtClean="0">
+                <a:latin typeface="Courier New" panose="02070309020205020404" pitchFamily="49" charset="0"/>
+                <a:cs typeface="Courier New" panose="02070309020205020404" pitchFamily="49" charset="0"/>
+              </a:rPr>
+              <a:t>3;</a:t>
+            </a:r>
+            <a:r>
+              <a:rPr lang="fr-FR" sz="1200" dirty="0">
+                <a:latin typeface="Courier New" panose="02070309020205020404" pitchFamily="49" charset="0"/>
+                <a:cs typeface="Courier New" panose="02070309020205020404" pitchFamily="49" charset="0"/>
+              </a:rPr>
+              <a:t>    cols = </a:t>
+            </a:r>
+            <a:r>
+              <a:rPr lang="fr-FR" sz="1200" dirty="0" smtClean="0">
+                <a:latin typeface="Courier New" panose="02070309020205020404" pitchFamily="49" charset="0"/>
+                <a:cs typeface="Courier New" panose="02070309020205020404" pitchFamily="49" charset="0"/>
+              </a:rPr>
+              <a:t>3; </a:t>
+            </a:r>
+            <a:r>
+              <a:rPr lang="fr-FR" sz="1200" dirty="0" err="1" smtClean="0">
+                <a:latin typeface="Courier New" panose="02070309020205020404" pitchFamily="49" charset="0"/>
+                <a:cs typeface="Courier New" panose="02070309020205020404" pitchFamily="49" charset="0"/>
+              </a:rPr>
+              <a:t>region_size</a:t>
+            </a:r>
+            <a:r>
+              <a:rPr lang="fr-FR" sz="1200" dirty="0" smtClean="0">
+                <a:latin typeface="Courier New" panose="02070309020205020404" pitchFamily="49" charset="0"/>
+                <a:cs typeface="Courier New" panose="02070309020205020404" pitchFamily="49" charset="0"/>
+              </a:rPr>
+              <a:t> </a:t>
+            </a:r>
+            <a:r>
+              <a:rPr lang="fr-FR" sz="1200" dirty="0">
+                <a:latin typeface="Courier New" panose="02070309020205020404" pitchFamily="49" charset="0"/>
+                <a:cs typeface="Courier New" panose="02070309020205020404" pitchFamily="49" charset="0"/>
+              </a:rPr>
+              <a:t>= 4000</a:t>
+            </a:r>
+            <a:br>
+              <a:rPr lang="fr-FR" sz="1200" dirty="0">
+                <a:latin typeface="Courier New" panose="02070309020205020404" pitchFamily="49" charset="0"/>
+                <a:cs typeface="Courier New" panose="02070309020205020404" pitchFamily="49" charset="0"/>
+              </a:rPr>
+            </a:br>
+            <a:r>
+              <a:rPr lang="fr-FR" sz="1200" dirty="0">
+                <a:latin typeface="Courier New" panose="02070309020205020404" pitchFamily="49" charset="0"/>
+                <a:cs typeface="Courier New" panose="02070309020205020404" pitchFamily="49" charset="0"/>
+              </a:rPr>
+              <a:t/>
+            </a:r>
+            <a:br>
+              <a:rPr lang="fr-FR" sz="1200" dirty="0">
+                <a:latin typeface="Courier New" panose="02070309020205020404" pitchFamily="49" charset="0"/>
+                <a:cs typeface="Courier New" panose="02070309020205020404" pitchFamily="49" charset="0"/>
+              </a:rPr>
+            </a:br>
+            <a:r>
+              <a:rPr lang="fr-FR" sz="1200" dirty="0">
+                <a:latin typeface="Courier New" panose="02070309020205020404" pitchFamily="49" charset="0"/>
+                <a:cs typeface="Courier New" panose="02070309020205020404" pitchFamily="49" charset="0"/>
+              </a:rPr>
+              <a:t>    </a:t>
+            </a:r>
+            <a:r>
+              <a:rPr lang="fr-FR" sz="1200" dirty="0" err="1">
+                <a:latin typeface="Courier New" panose="02070309020205020404" pitchFamily="49" charset="0"/>
+                <a:cs typeface="Courier New" panose="02070309020205020404" pitchFamily="49" charset="0"/>
+              </a:rPr>
+              <a:t>regions</a:t>
+            </a:r>
+            <a:r>
+              <a:rPr lang="fr-FR" sz="1200" dirty="0">
+                <a:latin typeface="Courier New" panose="02070309020205020404" pitchFamily="49" charset="0"/>
+                <a:cs typeface="Courier New" panose="02070309020205020404" pitchFamily="49" charset="0"/>
+              </a:rPr>
+              <a:t> = </a:t>
+            </a:r>
+            <a:r>
+              <a:rPr lang="fr-FR" sz="1200" dirty="0" smtClean="0">
+                <a:latin typeface="Courier New" panose="02070309020205020404" pitchFamily="49" charset="0"/>
+                <a:cs typeface="Courier New" panose="02070309020205020404" pitchFamily="49" charset="0"/>
+              </a:rPr>
+              <a:t>[]; </a:t>
+            </a:r>
+            <a:r>
+              <a:rPr lang="fr-FR" sz="1200" dirty="0" err="1" smtClean="0">
+                <a:latin typeface="Courier New" panose="02070309020205020404" pitchFamily="49" charset="0"/>
+                <a:cs typeface="Courier New" panose="02070309020205020404" pitchFamily="49" charset="0"/>
+              </a:rPr>
+              <a:t>region_id</a:t>
+            </a:r>
+            <a:r>
+              <a:rPr lang="fr-FR" sz="1200" dirty="0" smtClean="0">
+                <a:latin typeface="Courier New" panose="02070309020205020404" pitchFamily="49" charset="0"/>
+                <a:cs typeface="Courier New" panose="02070309020205020404" pitchFamily="49" charset="0"/>
+              </a:rPr>
+              <a:t> </a:t>
+            </a:r>
+            <a:r>
+              <a:rPr lang="fr-FR" sz="1200" dirty="0">
+                <a:latin typeface="Courier New" panose="02070309020205020404" pitchFamily="49" charset="0"/>
+                <a:cs typeface="Courier New" panose="02070309020205020404" pitchFamily="49" charset="0"/>
+              </a:rPr>
+              <a:t>= 0</a:t>
+            </a:r>
+            <a:br>
+              <a:rPr lang="fr-FR" sz="1200" dirty="0">
+                <a:latin typeface="Courier New" panose="02070309020205020404" pitchFamily="49" charset="0"/>
+                <a:cs typeface="Courier New" panose="02070309020205020404" pitchFamily="49" charset="0"/>
+              </a:rPr>
+            </a:br>
+            <a:r>
+              <a:rPr lang="fr-FR" sz="1200" dirty="0">
+                <a:latin typeface="Courier New" panose="02070309020205020404" pitchFamily="49" charset="0"/>
+                <a:cs typeface="Courier New" panose="02070309020205020404" pitchFamily="49" charset="0"/>
+              </a:rPr>
+              <a:t/>
+            </a:r>
+            <a:br>
+              <a:rPr lang="fr-FR" sz="1200" dirty="0">
+                <a:latin typeface="Courier New" panose="02070309020205020404" pitchFamily="49" charset="0"/>
+                <a:cs typeface="Courier New" panose="02070309020205020404" pitchFamily="49" charset="0"/>
+              </a:rPr>
+            </a:br>
+            <a:r>
+              <a:rPr lang="fr-FR" sz="1200" dirty="0">
+                <a:latin typeface="Courier New" panose="02070309020205020404" pitchFamily="49" charset="0"/>
+                <a:cs typeface="Courier New" panose="02070309020205020404" pitchFamily="49" charset="0"/>
+              </a:rPr>
+              <a:t>    # </a:t>
+            </a:r>
+            <a:r>
+              <a:rPr lang="fr-FR" sz="1200" dirty="0" err="1">
+                <a:latin typeface="Courier New" panose="02070309020205020404" pitchFamily="49" charset="0"/>
+                <a:cs typeface="Courier New" panose="02070309020205020404" pitchFamily="49" charset="0"/>
+              </a:rPr>
+              <a:t>initialize</a:t>
+            </a:r>
+            <a:r>
+              <a:rPr lang="fr-FR" sz="1200" dirty="0">
+                <a:latin typeface="Courier New" panose="02070309020205020404" pitchFamily="49" charset="0"/>
+                <a:cs typeface="Courier New" panose="02070309020205020404" pitchFamily="49" charset="0"/>
+              </a:rPr>
+              <a:t> </a:t>
+            </a:r>
+            <a:r>
+              <a:rPr lang="fr-FR" sz="1200" dirty="0" err="1">
+                <a:latin typeface="Courier New" panose="02070309020205020404" pitchFamily="49" charset="0"/>
+                <a:cs typeface="Courier New" panose="02070309020205020404" pitchFamily="49" charset="0"/>
+              </a:rPr>
+              <a:t>region</a:t>
+            </a:r>
+            <a:r>
+              <a:rPr lang="fr-FR" sz="1200" dirty="0">
+                <a:latin typeface="Courier New" panose="02070309020205020404" pitchFamily="49" charset="0"/>
+                <a:cs typeface="Courier New" panose="02070309020205020404" pitchFamily="49" charset="0"/>
+              </a:rPr>
+              <a:t> </a:t>
+            </a:r>
+            <a:r>
+              <a:rPr lang="fr-FR" sz="1200" dirty="0" err="1">
+                <a:latin typeface="Courier New" panose="02070309020205020404" pitchFamily="49" charset="0"/>
+                <a:cs typeface="Courier New" panose="02070309020205020404" pitchFamily="49" charset="0"/>
+              </a:rPr>
+              <a:t>descriptors</a:t>
+            </a:r>
+            <a:r>
+              <a:rPr lang="fr-FR" sz="1200" dirty="0">
+                <a:latin typeface="Courier New" panose="02070309020205020404" pitchFamily="49" charset="0"/>
+                <a:cs typeface="Courier New" panose="02070309020205020404" pitchFamily="49" charset="0"/>
+              </a:rPr>
+              <a:t/>
+            </a:r>
+            <a:br>
+              <a:rPr lang="fr-FR" sz="1200" dirty="0">
+                <a:latin typeface="Courier New" panose="02070309020205020404" pitchFamily="49" charset="0"/>
+                <a:cs typeface="Courier New" panose="02070309020205020404" pitchFamily="49" charset="0"/>
+              </a:rPr>
+            </a:br>
+            <a:r>
+              <a:rPr lang="fr-FR" sz="1200" dirty="0">
+                <a:latin typeface="Courier New" panose="02070309020205020404" pitchFamily="49" charset="0"/>
+                <a:cs typeface="Courier New" panose="02070309020205020404" pitchFamily="49" charset="0"/>
+              </a:rPr>
+              <a:t>    for r in range(</a:t>
+            </a:r>
+            <a:r>
+              <a:rPr lang="fr-FR" sz="1200" dirty="0" err="1">
+                <a:latin typeface="Courier New" panose="02070309020205020404" pitchFamily="49" charset="0"/>
+                <a:cs typeface="Courier New" panose="02070309020205020404" pitchFamily="49" charset="0"/>
+              </a:rPr>
+              <a:t>rows</a:t>
+            </a:r>
+            <a:r>
+              <a:rPr lang="fr-FR" sz="1200" dirty="0">
+                <a:latin typeface="Courier New" panose="02070309020205020404" pitchFamily="49" charset="0"/>
+                <a:cs typeface="Courier New" panose="02070309020205020404" pitchFamily="49" charset="0"/>
+              </a:rPr>
+              <a:t>):</a:t>
+            </a:r>
+            <a:br>
+              <a:rPr lang="fr-FR" sz="1200" dirty="0">
+                <a:latin typeface="Courier New" panose="02070309020205020404" pitchFamily="49" charset="0"/>
+                <a:cs typeface="Courier New" panose="02070309020205020404" pitchFamily="49" charset="0"/>
+              </a:rPr>
+            </a:br>
+            <a:r>
+              <a:rPr lang="fr-FR" sz="1200" dirty="0">
+                <a:latin typeface="Courier New" panose="02070309020205020404" pitchFamily="49" charset="0"/>
+                <a:cs typeface="Courier New" panose="02070309020205020404" pitchFamily="49" charset="0"/>
+              </a:rPr>
+              <a:t>        for c in range(cols</a:t>
+            </a:r>
+            <a:r>
+              <a:rPr lang="fr-FR" sz="1200" dirty="0" smtClean="0">
+                <a:latin typeface="Courier New" panose="02070309020205020404" pitchFamily="49" charset="0"/>
+                <a:cs typeface="Courier New" panose="02070309020205020404" pitchFamily="49" charset="0"/>
+              </a:rPr>
+              <a:t>):</a:t>
+            </a:r>
+          </a:p>
+          <a:p>
+            <a:r>
+              <a:rPr lang="fr-FR" sz="1200" dirty="0">
+                <a:latin typeface="Courier New" panose="02070309020205020404" pitchFamily="49" charset="0"/>
+                <a:cs typeface="Courier New" panose="02070309020205020404" pitchFamily="49" charset="0"/>
+              </a:rPr>
+              <a:t> </a:t>
+            </a:r>
+            <a:r>
+              <a:rPr lang="fr-FR" sz="1200" dirty="0" smtClean="0">
+                <a:latin typeface="Courier New" panose="02070309020205020404" pitchFamily="49" charset="0"/>
+                <a:cs typeface="Courier New" panose="02070309020205020404" pitchFamily="49" charset="0"/>
+              </a:rPr>
+              <a:t>           ra = ...; </a:t>
+            </a:r>
+            <a:r>
+              <a:rPr lang="fr-FR" sz="1200" dirty="0" err="1" smtClean="0">
+                <a:latin typeface="Courier New" panose="02070309020205020404" pitchFamily="49" charset="0"/>
+                <a:cs typeface="Courier New" panose="02070309020205020404" pitchFamily="49" charset="0"/>
+              </a:rPr>
+              <a:t>dec</a:t>
+            </a:r>
+            <a:r>
+              <a:rPr lang="fr-FR" sz="1200" dirty="0" smtClean="0">
+                <a:latin typeface="Courier New" panose="02070309020205020404" pitchFamily="49" charset="0"/>
+                <a:cs typeface="Courier New" panose="02070309020205020404" pitchFamily="49" charset="0"/>
+              </a:rPr>
+              <a:t> = ...</a:t>
+            </a:r>
+            <a:r>
+              <a:rPr lang="fr-FR" sz="1200" dirty="0">
+                <a:latin typeface="Courier New" panose="02070309020205020404" pitchFamily="49" charset="0"/>
+                <a:cs typeface="Courier New" panose="02070309020205020404" pitchFamily="49" charset="0"/>
+              </a:rPr>
+              <a:t/>
+            </a:r>
+            <a:br>
+              <a:rPr lang="fr-FR" sz="1200" dirty="0">
+                <a:latin typeface="Courier New" panose="02070309020205020404" pitchFamily="49" charset="0"/>
+                <a:cs typeface="Courier New" panose="02070309020205020404" pitchFamily="49" charset="0"/>
+              </a:rPr>
+            </a:br>
+            <a:r>
+              <a:rPr lang="fr-FR" sz="1200" dirty="0">
+                <a:latin typeface="Courier New" panose="02070309020205020404" pitchFamily="49" charset="0"/>
+                <a:cs typeface="Courier New" panose="02070309020205020404" pitchFamily="49" charset="0"/>
+              </a:rPr>
+              <a:t>            </a:t>
+            </a:r>
+            <a:r>
+              <a:rPr lang="fr-FR" sz="1200" dirty="0" err="1">
+                <a:latin typeface="Courier New" panose="02070309020205020404" pitchFamily="49" charset="0"/>
+                <a:cs typeface="Courier New" panose="02070309020205020404" pitchFamily="49" charset="0"/>
+              </a:rPr>
+              <a:t>regions.append</a:t>
+            </a:r>
+            <a:r>
+              <a:rPr lang="fr-FR" sz="1200" dirty="0">
+                <a:latin typeface="Courier New" panose="02070309020205020404" pitchFamily="49" charset="0"/>
+                <a:cs typeface="Courier New" panose="02070309020205020404" pitchFamily="49" charset="0"/>
+              </a:rPr>
+              <a:t>((</a:t>
+            </a:r>
+            <a:r>
+              <a:rPr lang="fr-FR" sz="1200" dirty="0" err="1">
+                <a:latin typeface="Courier New" panose="02070309020205020404" pitchFamily="49" charset="0"/>
+                <a:cs typeface="Courier New" panose="02070309020205020404" pitchFamily="49" charset="0"/>
+              </a:rPr>
+              <a:t>region_id</a:t>
+            </a:r>
+            <a:r>
+              <a:rPr lang="fr-FR" sz="1200" dirty="0">
+                <a:latin typeface="Courier New" panose="02070309020205020404" pitchFamily="49" charset="0"/>
+                <a:cs typeface="Courier New" panose="02070309020205020404" pitchFamily="49" charset="0"/>
+              </a:rPr>
+              <a:t>, </a:t>
+            </a:r>
+            <a:r>
+              <a:rPr lang="fr-FR" sz="1200" dirty="0" smtClean="0">
+                <a:latin typeface="Courier New" panose="02070309020205020404" pitchFamily="49" charset="0"/>
+                <a:cs typeface="Courier New" panose="02070309020205020404" pitchFamily="49" charset="0"/>
+              </a:rPr>
+              <a:t>ra, </a:t>
+            </a:r>
+            <a:r>
+              <a:rPr lang="fr-FR" sz="1200" dirty="0" err="1" smtClean="0">
+                <a:latin typeface="Courier New" panose="02070309020205020404" pitchFamily="49" charset="0"/>
+                <a:cs typeface="Courier New" panose="02070309020205020404" pitchFamily="49" charset="0"/>
+              </a:rPr>
+              <a:t>dec</a:t>
+            </a:r>
+            <a:r>
+              <a:rPr lang="fr-FR" sz="1200" dirty="0">
+                <a:latin typeface="Courier New" panose="02070309020205020404" pitchFamily="49" charset="0"/>
+                <a:cs typeface="Courier New" panose="02070309020205020404" pitchFamily="49" charset="0"/>
+              </a:rPr>
+              <a:t>))</a:t>
+            </a:r>
+            <a:br>
+              <a:rPr lang="fr-FR" sz="1200" dirty="0">
+                <a:latin typeface="Courier New" panose="02070309020205020404" pitchFamily="49" charset="0"/>
+                <a:cs typeface="Courier New" panose="02070309020205020404" pitchFamily="49" charset="0"/>
+              </a:rPr>
+            </a:br>
+            <a:r>
+              <a:rPr lang="fr-FR" sz="1200" dirty="0">
+                <a:latin typeface="Courier New" panose="02070309020205020404" pitchFamily="49" charset="0"/>
+                <a:cs typeface="Courier New" panose="02070309020205020404" pitchFamily="49" charset="0"/>
+              </a:rPr>
+              <a:t>            </a:t>
+            </a:r>
+            <a:r>
+              <a:rPr lang="fr-FR" sz="1200" dirty="0" err="1">
+                <a:latin typeface="Courier New" panose="02070309020205020404" pitchFamily="49" charset="0"/>
+                <a:cs typeface="Courier New" panose="02070309020205020404" pitchFamily="49" charset="0"/>
+              </a:rPr>
+              <a:t>region_id</a:t>
+            </a:r>
+            <a:r>
+              <a:rPr lang="fr-FR" sz="1200" dirty="0">
+                <a:latin typeface="Courier New" panose="02070309020205020404" pitchFamily="49" charset="0"/>
+                <a:cs typeface="Courier New" panose="02070309020205020404" pitchFamily="49" charset="0"/>
+              </a:rPr>
+              <a:t> += 1</a:t>
+            </a:r>
+            <a:br>
+              <a:rPr lang="fr-FR" sz="1200" dirty="0">
+                <a:latin typeface="Courier New" panose="02070309020205020404" pitchFamily="49" charset="0"/>
+                <a:cs typeface="Courier New" panose="02070309020205020404" pitchFamily="49" charset="0"/>
+              </a:rPr>
+            </a:br>
+            <a:r>
+              <a:rPr lang="fr-FR" sz="1200" dirty="0">
+                <a:latin typeface="Courier New" panose="02070309020205020404" pitchFamily="49" charset="0"/>
+                <a:cs typeface="Courier New" panose="02070309020205020404" pitchFamily="49" charset="0"/>
+              </a:rPr>
+              <a:t/>
+            </a:r>
+            <a:br>
+              <a:rPr lang="fr-FR" sz="1200" dirty="0">
+                <a:latin typeface="Courier New" panose="02070309020205020404" pitchFamily="49" charset="0"/>
+                <a:cs typeface="Courier New" panose="02070309020205020404" pitchFamily="49" charset="0"/>
+              </a:rPr>
+            </a:br>
+            <a:r>
+              <a:rPr lang="fr-FR" sz="1200" dirty="0">
+                <a:latin typeface="Courier New" panose="02070309020205020404" pitchFamily="49" charset="0"/>
+                <a:cs typeface="Courier New" panose="02070309020205020404" pitchFamily="49" charset="0"/>
+              </a:rPr>
+              <a:t>    </a:t>
+            </a:r>
+            <a:r>
+              <a:rPr lang="fr-FR" sz="1200" dirty="0" err="1">
+                <a:latin typeface="Courier New" panose="02070309020205020404" pitchFamily="49" charset="0"/>
+                <a:cs typeface="Courier New" panose="02070309020205020404" pitchFamily="49" charset="0"/>
+              </a:rPr>
+              <a:t>rdd</a:t>
+            </a:r>
+            <a:r>
+              <a:rPr lang="fr-FR" sz="1200" dirty="0">
+                <a:latin typeface="Courier New" panose="02070309020205020404" pitchFamily="49" charset="0"/>
+                <a:cs typeface="Courier New" panose="02070309020205020404" pitchFamily="49" charset="0"/>
+              </a:rPr>
+              <a:t> = </a:t>
+            </a:r>
+            <a:r>
+              <a:rPr lang="fr-FR" sz="1200" dirty="0" err="1">
+                <a:latin typeface="Courier New" panose="02070309020205020404" pitchFamily="49" charset="0"/>
+                <a:cs typeface="Courier New" panose="02070309020205020404" pitchFamily="49" charset="0"/>
+              </a:rPr>
+              <a:t>sc.parallelize</a:t>
+            </a:r>
+            <a:r>
+              <a:rPr lang="fr-FR" sz="1200" dirty="0">
+                <a:latin typeface="Courier New" panose="02070309020205020404" pitchFamily="49" charset="0"/>
+                <a:cs typeface="Courier New" panose="02070309020205020404" pitchFamily="49" charset="0"/>
+              </a:rPr>
+              <a:t>(</a:t>
+            </a:r>
+            <a:r>
+              <a:rPr lang="fr-FR" sz="1200" dirty="0" err="1">
+                <a:latin typeface="Courier New" panose="02070309020205020404" pitchFamily="49" charset="0"/>
+                <a:cs typeface="Courier New" panose="02070309020205020404" pitchFamily="49" charset="0"/>
+              </a:rPr>
+              <a:t>regions</a:t>
+            </a:r>
+            <a:r>
+              <a:rPr lang="fr-FR" sz="1200" dirty="0" smtClean="0">
+                <a:latin typeface="Courier New" panose="02070309020205020404" pitchFamily="49" charset="0"/>
+                <a:cs typeface="Courier New" panose="02070309020205020404" pitchFamily="49" charset="0"/>
+              </a:rPr>
+              <a:t>).</a:t>
+            </a:r>
+            <a:r>
+              <a:rPr lang="fr-FR" sz="1200" dirty="0" err="1" smtClean="0">
+                <a:latin typeface="Courier New" panose="02070309020205020404" pitchFamily="49" charset="0"/>
+                <a:cs typeface="Courier New" panose="02070309020205020404" pitchFamily="49" charset="0"/>
+              </a:rPr>
+              <a:t>map</a:t>
+            </a:r>
+            <a:r>
+              <a:rPr lang="fr-FR" sz="1200" dirty="0" smtClean="0">
+                <a:latin typeface="Courier New" panose="02070309020205020404" pitchFamily="49" charset="0"/>
+                <a:cs typeface="Courier New" panose="02070309020205020404" pitchFamily="49" charset="0"/>
+              </a:rPr>
+              <a:t>(lambda x: </a:t>
+            </a:r>
+            <a:r>
+              <a:rPr lang="fr-FR" sz="1200" dirty="0" err="1" smtClean="0">
+                <a:latin typeface="Courier New" panose="02070309020205020404" pitchFamily="49" charset="0"/>
+                <a:cs typeface="Courier New" panose="02070309020205020404" pitchFamily="49" charset="0"/>
+              </a:rPr>
+              <a:t>fill_image</a:t>
+            </a:r>
+            <a:r>
+              <a:rPr lang="fr-FR" sz="1200" dirty="0" smtClean="0">
+                <a:latin typeface="Courier New" panose="02070309020205020404" pitchFamily="49" charset="0"/>
+                <a:cs typeface="Courier New" panose="02070309020205020404" pitchFamily="49" charset="0"/>
+              </a:rPr>
+              <a:t>(x))</a:t>
+            </a:r>
+          </a:p>
+          <a:p>
+            <a:r>
+              <a:rPr lang="fr-FR" sz="1200" dirty="0">
+                <a:latin typeface="Courier New" panose="02070309020205020404" pitchFamily="49" charset="0"/>
+                <a:cs typeface="Courier New" panose="02070309020205020404" pitchFamily="49" charset="0"/>
+              </a:rPr>
+              <a:t/>
+            </a:r>
+            <a:br>
+              <a:rPr lang="fr-FR" sz="1200" dirty="0">
+                <a:latin typeface="Courier New" panose="02070309020205020404" pitchFamily="49" charset="0"/>
+                <a:cs typeface="Courier New" panose="02070309020205020404" pitchFamily="49" charset="0"/>
+              </a:rPr>
+            </a:br>
+            <a:r>
+              <a:rPr lang="fr-FR" sz="1200" dirty="0">
+                <a:latin typeface="Courier New" panose="02070309020205020404" pitchFamily="49" charset="0"/>
+                <a:cs typeface="Courier New" panose="02070309020205020404" pitchFamily="49" charset="0"/>
+              </a:rPr>
+              <a:t>    </a:t>
+            </a:r>
+            <a:r>
+              <a:rPr lang="fr-FR" sz="1200" dirty="0" err="1">
+                <a:latin typeface="Courier New" panose="02070309020205020404" pitchFamily="49" charset="0"/>
+                <a:cs typeface="Courier New" panose="02070309020205020404" pitchFamily="49" charset="0"/>
+              </a:rPr>
+              <a:t>df</a:t>
+            </a:r>
+            <a:r>
+              <a:rPr lang="fr-FR" sz="1200" dirty="0">
+                <a:latin typeface="Courier New" panose="02070309020205020404" pitchFamily="49" charset="0"/>
+                <a:cs typeface="Courier New" panose="02070309020205020404" pitchFamily="49" charset="0"/>
+              </a:rPr>
+              <a:t> = </a:t>
+            </a:r>
+            <a:r>
+              <a:rPr lang="fr-FR" sz="1200" dirty="0" err="1">
+                <a:latin typeface="Courier New" panose="02070309020205020404" pitchFamily="49" charset="0"/>
+                <a:cs typeface="Courier New" panose="02070309020205020404" pitchFamily="49" charset="0"/>
+              </a:rPr>
+              <a:t>spark.createDataFrame</a:t>
+            </a:r>
+            <a:r>
+              <a:rPr lang="fr-FR" sz="1200" dirty="0">
+                <a:latin typeface="Courier New" panose="02070309020205020404" pitchFamily="49" charset="0"/>
+                <a:cs typeface="Courier New" panose="02070309020205020404" pitchFamily="49" charset="0"/>
+              </a:rPr>
+              <a:t>(</a:t>
+            </a:r>
+            <a:r>
+              <a:rPr lang="fr-FR" sz="1200" dirty="0" err="1">
+                <a:latin typeface="Courier New" panose="02070309020205020404" pitchFamily="49" charset="0"/>
+                <a:cs typeface="Courier New" panose="02070309020205020404" pitchFamily="49" charset="0"/>
+              </a:rPr>
+              <a:t>rdd</a:t>
+            </a:r>
+            <a:r>
+              <a:rPr lang="fr-FR" sz="1200" dirty="0">
+                <a:latin typeface="Courier New" panose="02070309020205020404" pitchFamily="49" charset="0"/>
+                <a:cs typeface="Courier New" panose="02070309020205020404" pitchFamily="49" charset="0"/>
+              </a:rPr>
+              <a:t>, </a:t>
+            </a:r>
+            <a:r>
+              <a:rPr lang="fr-FR" sz="1200" dirty="0" err="1" smtClean="0">
+                <a:latin typeface="Courier New" panose="02070309020205020404" pitchFamily="49" charset="0"/>
+                <a:cs typeface="Courier New" panose="02070309020205020404" pitchFamily="49" charset="0"/>
+              </a:rPr>
+              <a:t>make_schema</a:t>
+            </a:r>
+            <a:r>
+              <a:rPr lang="fr-FR" sz="1200" dirty="0" smtClean="0">
+                <a:latin typeface="Courier New" panose="02070309020205020404" pitchFamily="49" charset="0"/>
+                <a:cs typeface="Courier New" panose="02070309020205020404" pitchFamily="49" charset="0"/>
+              </a:rPr>
+              <a:t>())</a:t>
+            </a:r>
+          </a:p>
+          <a:p>
+            <a:r>
+              <a:rPr lang="fr-FR" sz="1200" dirty="0">
+                <a:latin typeface="Courier New" panose="02070309020205020404" pitchFamily="49" charset="0"/>
+                <a:cs typeface="Courier New" panose="02070309020205020404" pitchFamily="49" charset="0"/>
+              </a:rPr>
+              <a:t/>
+            </a:r>
+            <a:br>
+              <a:rPr lang="fr-FR" sz="1200" dirty="0">
+                <a:latin typeface="Courier New" panose="02070309020205020404" pitchFamily="49" charset="0"/>
+                <a:cs typeface="Courier New" panose="02070309020205020404" pitchFamily="49" charset="0"/>
+              </a:rPr>
+            </a:br>
+            <a:r>
+              <a:rPr lang="fr-FR" sz="1200" dirty="0" smtClean="0">
+                <a:latin typeface="Courier New" panose="02070309020205020404" pitchFamily="49" charset="0"/>
+                <a:cs typeface="Courier New" panose="02070309020205020404" pitchFamily="49" charset="0"/>
+              </a:rPr>
+              <a:t> </a:t>
+            </a:r>
+            <a:r>
+              <a:rPr lang="fr-FR" sz="1200" dirty="0">
+                <a:latin typeface="Courier New" panose="02070309020205020404" pitchFamily="49" charset="0"/>
+                <a:cs typeface="Courier New" panose="02070309020205020404" pitchFamily="49" charset="0"/>
+              </a:rPr>
+              <a:t>   </a:t>
+            </a:r>
+            <a:r>
+              <a:rPr lang="fr-FR" sz="1200" dirty="0" err="1">
+                <a:latin typeface="Courier New" panose="02070309020205020404" pitchFamily="49" charset="0"/>
+                <a:cs typeface="Courier New" panose="02070309020205020404" pitchFamily="49" charset="0"/>
+              </a:rPr>
+              <a:t>df.write.format</a:t>
+            </a:r>
+            <a:r>
+              <a:rPr lang="fr-FR" sz="1200" dirty="0">
+                <a:latin typeface="Courier New" panose="02070309020205020404" pitchFamily="49" charset="0"/>
+                <a:cs typeface="Courier New" panose="02070309020205020404" pitchFamily="49" charset="0"/>
+              </a:rPr>
+              <a:t>("</a:t>
+            </a:r>
+            <a:r>
+              <a:rPr lang="fr-FR" sz="1200" dirty="0" err="1">
+                <a:latin typeface="Courier New" panose="02070309020205020404" pitchFamily="49" charset="0"/>
+                <a:cs typeface="Courier New" panose="02070309020205020404" pitchFamily="49" charset="0"/>
+              </a:rPr>
+              <a:t>com.databricks.spark.avro</a:t>
+            </a:r>
+            <a:r>
+              <a:rPr lang="fr-FR" sz="1200" dirty="0">
+                <a:latin typeface="Courier New" panose="02070309020205020404" pitchFamily="49" charset="0"/>
+                <a:cs typeface="Courier New" panose="02070309020205020404" pitchFamily="49" charset="0"/>
+              </a:rPr>
+              <a:t>").mode("</a:t>
+            </a:r>
+            <a:r>
+              <a:rPr lang="fr-FR" sz="1200" dirty="0" err="1">
+                <a:latin typeface="Courier New" panose="02070309020205020404" pitchFamily="49" charset="0"/>
+                <a:cs typeface="Courier New" panose="02070309020205020404" pitchFamily="49" charset="0"/>
+              </a:rPr>
+              <a:t>overwrite</a:t>
+            </a:r>
+            <a:r>
+              <a:rPr lang="fr-FR" sz="1200" dirty="0">
+                <a:latin typeface="Courier New" panose="02070309020205020404" pitchFamily="49" charset="0"/>
+                <a:cs typeface="Courier New" panose="02070309020205020404" pitchFamily="49" charset="0"/>
+              </a:rPr>
+              <a:t>").</a:t>
+            </a:r>
+            <a:r>
+              <a:rPr lang="fr-FR" sz="1200" dirty="0" err="1">
+                <a:latin typeface="Courier New" panose="02070309020205020404" pitchFamily="49" charset="0"/>
+                <a:cs typeface="Courier New" panose="02070309020205020404" pitchFamily="49" charset="0"/>
+              </a:rPr>
+              <a:t>save</a:t>
+            </a:r>
+            <a:r>
+              <a:rPr lang="fr-FR" sz="1200" dirty="0">
+                <a:latin typeface="Courier New" panose="02070309020205020404" pitchFamily="49" charset="0"/>
+                <a:cs typeface="Courier New" panose="02070309020205020404" pitchFamily="49" charset="0"/>
+              </a:rPr>
+              <a:t>("./images</a:t>
+            </a:r>
+            <a:r>
+              <a:rPr lang="fr-FR" sz="1200" dirty="0" smtClean="0">
+                <a:latin typeface="Courier New" panose="02070309020205020404" pitchFamily="49" charset="0"/>
+                <a:cs typeface="Courier New" panose="02070309020205020404" pitchFamily="49" charset="0"/>
+              </a:rPr>
+              <a:t>")</a:t>
+            </a:r>
+          </a:p>
+        </p:txBody>
+      </p:sp>
+      <p:sp>
+        <p:nvSpPr>
+          <p:cNvPr id="5" name="ZoneTexte 4"/>
+          <p:cNvSpPr txBox="1"/>
+          <p:nvPr/>
+        </p:nvSpPr>
+        <p:spPr>
+          <a:xfrm>
+            <a:off x="6446358" y="4150821"/>
+            <a:ext cx="2230098" cy="646331"/>
+          </a:xfrm>
+          <a:prstGeom prst="rect">
+            <a:avLst/>
+          </a:prstGeom>
+          <a:solidFill>
+            <a:schemeClr val="accent2">
+              <a:lumMod val="20000"/>
+              <a:lumOff val="80000"/>
+            </a:schemeClr>
+          </a:solidFill>
+          <a:ln>
+            <a:solidFill>
+              <a:srgbClr val="0070C0"/>
+            </a:solidFill>
+          </a:ln>
+        </p:spPr>
+        <p:txBody>
+          <a:bodyPr wrap="none" rtlCol="0">
+            <a:spAutoFit/>
+          </a:bodyPr>
+          <a:lstStyle/>
+          <a:p>
+            <a:r>
+              <a:rPr lang="fr-FR" sz="1200" dirty="0" err="1" smtClean="0">
+                <a:latin typeface="Courier New" panose="02070309020205020404" pitchFamily="49" charset="0"/>
+                <a:cs typeface="Courier New" panose="02070309020205020404" pitchFamily="49" charset="0"/>
+              </a:rPr>
+              <a:t>def</a:t>
+            </a:r>
+            <a:r>
+              <a:rPr lang="fr-FR" sz="1200" dirty="0" smtClean="0">
+                <a:latin typeface="Courier New" panose="02070309020205020404" pitchFamily="49" charset="0"/>
+                <a:cs typeface="Courier New" panose="02070309020205020404" pitchFamily="49" charset="0"/>
+              </a:rPr>
+              <a:t> </a:t>
+            </a:r>
+            <a:r>
+              <a:rPr lang="fr-FR" sz="1200" dirty="0" err="1" smtClean="0">
+                <a:latin typeface="Courier New" panose="02070309020205020404" pitchFamily="49" charset="0"/>
+                <a:cs typeface="Courier New" panose="02070309020205020404" pitchFamily="49" charset="0"/>
+              </a:rPr>
+              <a:t>fill_image</a:t>
+            </a:r>
+            <a:r>
+              <a:rPr lang="fr-FR" sz="1200" dirty="0" smtClean="0">
+                <a:latin typeface="Courier New" panose="02070309020205020404" pitchFamily="49" charset="0"/>
+                <a:cs typeface="Courier New" panose="02070309020205020404" pitchFamily="49" charset="0"/>
+              </a:rPr>
+              <a:t>(image):</a:t>
+            </a:r>
+          </a:p>
+          <a:p>
+            <a:r>
+              <a:rPr lang="fr-FR" sz="1200" dirty="0" smtClean="0">
+                <a:latin typeface="Courier New" panose="02070309020205020404" pitchFamily="49" charset="0"/>
+                <a:cs typeface="Courier New" panose="02070309020205020404" pitchFamily="49" charset="0"/>
+              </a:rPr>
+              <a:t>    </a:t>
+            </a:r>
+            <a:r>
+              <a:rPr lang="fr-FR" sz="1200" dirty="0" err="1" smtClean="0">
+                <a:latin typeface="Courier New" panose="02070309020205020404" pitchFamily="49" charset="0"/>
+                <a:cs typeface="Courier New" panose="02070309020205020404" pitchFamily="49" charset="0"/>
+              </a:rPr>
+              <a:t>filled</a:t>
+            </a:r>
+            <a:r>
+              <a:rPr lang="fr-FR" sz="1200" dirty="0" smtClean="0">
+                <a:latin typeface="Courier New" panose="02070309020205020404" pitchFamily="49" charset="0"/>
+                <a:cs typeface="Courier New" panose="02070309020205020404" pitchFamily="49" charset="0"/>
+              </a:rPr>
+              <a:t> = ...</a:t>
+            </a:r>
+          </a:p>
+          <a:p>
+            <a:r>
+              <a:rPr lang="fr-FR" sz="1200" dirty="0">
+                <a:latin typeface="Courier New" panose="02070309020205020404" pitchFamily="49" charset="0"/>
+                <a:cs typeface="Courier New" panose="02070309020205020404" pitchFamily="49" charset="0"/>
+              </a:rPr>
+              <a:t> </a:t>
+            </a:r>
+            <a:r>
+              <a:rPr lang="fr-FR" sz="1200" dirty="0" smtClean="0">
+                <a:latin typeface="Courier New" panose="02070309020205020404" pitchFamily="49" charset="0"/>
+                <a:cs typeface="Courier New" panose="02070309020205020404" pitchFamily="49" charset="0"/>
+              </a:rPr>
+              <a:t>   return </a:t>
+            </a:r>
+            <a:r>
+              <a:rPr lang="fr-FR" sz="1200" dirty="0" err="1" smtClean="0">
+                <a:latin typeface="Courier New" panose="02070309020205020404" pitchFamily="49" charset="0"/>
+                <a:cs typeface="Courier New" panose="02070309020205020404" pitchFamily="49" charset="0"/>
+              </a:rPr>
+              <a:t>filled</a:t>
+            </a:r>
+            <a:endParaRPr lang="fr-FR" sz="1200" dirty="0" smtClean="0">
+              <a:latin typeface="Courier New" panose="02070309020205020404" pitchFamily="49" charset="0"/>
+              <a:cs typeface="Courier New" panose="02070309020205020404" pitchFamily="49" charset="0"/>
+            </a:endParaRPr>
+          </a:p>
+        </p:txBody>
+      </p:sp>
+    </p:spTree>
+    <p:extLst>
+      <p:ext uri="{BB962C8B-B14F-4D97-AF65-F5344CB8AC3E}">
+        <p14:creationId xmlns:p14="http://schemas.microsoft.com/office/powerpoint/2010/main" val="398435638"/>
+      </p:ext>
+    </p:extLst>
+  </p:cSld>
+  <p:clrMapOvr>
+    <a:masterClrMapping/>
+  </p:clrMapOvr>
+  <p:timing>
+    <p:tnLst>
+      <p:par>
+        <p:cTn id="1" dur="indefinite" restart="never" nodeType="tmRoot"/>
+      </p:par>
+    </p:tnLst>
+  </p:timing>
+</p:sld>
+</file>
+
+<file path=ppt/slides/slide11.xml><?xml version="1.0" encoding="utf-8"?>
+<p:sld xmlns:a="http://schemas.openxmlformats.org/drawingml/2006/main" xmlns:r="http://schemas.openxmlformats.org/officeDocument/2006/relationships" xmlns:p="http://schemas.openxmlformats.org/presentationml/2006/main">
+  <p:cSld>
+    <p:spTree>
+      <p:nvGrpSpPr>
+        <p:cNvPr id="1" name=""/>
+        <p:cNvGrpSpPr/>
+        <p:nvPr/>
+      </p:nvGrpSpPr>
+      <p:grpSpPr>
+        <a:xfrm>
+          <a:off x="0" y="0"/>
+          <a:ext cx="0" cy="0"/>
+          <a:chOff x="0" y="0"/>
+          <a:chExt cx="0" cy="0"/>
+        </a:xfrm>
+      </p:grpSpPr>
+      <p:sp>
+        <p:nvSpPr>
+          <p:cNvPr id="2" name="Titre 1"/>
+          <p:cNvSpPr>
+            <a:spLocks noGrp="1"/>
+          </p:cNvSpPr>
+          <p:nvPr>
+            <p:ph type="title"/>
+          </p:nvPr>
+        </p:nvSpPr>
+        <p:spPr/>
+        <p:txBody>
+          <a:bodyPr>
+            <a:normAutofit fontScale="90000"/>
+          </a:bodyPr>
+          <a:lstStyle/>
+          <a:p>
+            <a:r>
+              <a:rPr lang="fr-FR" dirty="0" smtClean="0"/>
+              <a:t>Utilisation des images</a:t>
+            </a:r>
+            <a:endParaRPr lang="fr-FR" dirty="0"/>
+          </a:p>
+        </p:txBody>
+      </p:sp>
+      <p:sp>
+        <p:nvSpPr>
+          <p:cNvPr id="4" name="ZoneTexte 3"/>
+          <p:cNvSpPr txBox="1"/>
+          <p:nvPr/>
+        </p:nvSpPr>
+        <p:spPr>
+          <a:xfrm>
+            <a:off x="683568" y="1124744"/>
+            <a:ext cx="6878806" cy="1938992"/>
+          </a:xfrm>
+          <a:prstGeom prst="rect">
+            <a:avLst/>
+          </a:prstGeom>
+          <a:solidFill>
+            <a:schemeClr val="bg1">
+              <a:lumMod val="95000"/>
+            </a:schemeClr>
+          </a:solidFill>
+          <a:ln>
+            <a:solidFill>
+              <a:srgbClr val="0070C0"/>
+            </a:solidFill>
+          </a:ln>
+        </p:spPr>
+        <p:txBody>
+          <a:bodyPr wrap="none" rtlCol="0">
+            <a:spAutoFit/>
+          </a:bodyPr>
+          <a:lstStyle/>
+          <a:p>
+            <a:r>
+              <a:rPr lang="fr-FR" sz="1200" dirty="0" err="1">
+                <a:latin typeface="Courier New" panose="02070309020205020404" pitchFamily="49" charset="0"/>
+                <a:cs typeface="Courier New" panose="02070309020205020404" pitchFamily="49" charset="0"/>
+              </a:rPr>
+              <a:t>def</a:t>
+            </a:r>
+            <a:r>
+              <a:rPr lang="fr-FR" sz="1200" dirty="0">
+                <a:latin typeface="Courier New" panose="02070309020205020404" pitchFamily="49" charset="0"/>
+                <a:cs typeface="Courier New" panose="02070309020205020404" pitchFamily="49" charset="0"/>
+              </a:rPr>
+              <a:t> </a:t>
+            </a:r>
+            <a:r>
+              <a:rPr lang="fr-FR" sz="1200" dirty="0" err="1">
+                <a:latin typeface="Courier New" panose="02070309020205020404" pitchFamily="49" charset="0"/>
+                <a:cs typeface="Courier New" panose="02070309020205020404" pitchFamily="49" charset="0"/>
+              </a:rPr>
+              <a:t>analyze</a:t>
+            </a:r>
+            <a:r>
+              <a:rPr lang="fr-FR" sz="1200" dirty="0">
+                <a:latin typeface="Courier New" panose="02070309020205020404" pitchFamily="49" charset="0"/>
+                <a:cs typeface="Courier New" panose="02070309020205020404" pitchFamily="49" charset="0"/>
+              </a:rPr>
+              <a:t>(x):</a:t>
+            </a:r>
+            <a:br>
+              <a:rPr lang="fr-FR" sz="1200" dirty="0">
+                <a:latin typeface="Courier New" panose="02070309020205020404" pitchFamily="49" charset="0"/>
+                <a:cs typeface="Courier New" panose="02070309020205020404" pitchFamily="49" charset="0"/>
+              </a:rPr>
+            </a:br>
+            <a:r>
+              <a:rPr lang="fr-FR" sz="1200" dirty="0">
+                <a:latin typeface="Courier New" panose="02070309020205020404" pitchFamily="49" charset="0"/>
+                <a:cs typeface="Courier New" panose="02070309020205020404" pitchFamily="49" charset="0"/>
+              </a:rPr>
+              <a:t>    return '</a:t>
+            </a:r>
+            <a:r>
+              <a:rPr lang="fr-FR" sz="1200" dirty="0" err="1">
+                <a:latin typeface="Courier New" panose="02070309020205020404" pitchFamily="49" charset="0"/>
+                <a:cs typeface="Courier New" panose="02070309020205020404" pitchFamily="49" charset="0"/>
+              </a:rPr>
+              <a:t>analyze</a:t>
+            </a:r>
+            <a:r>
+              <a:rPr lang="fr-FR" sz="1200" dirty="0">
+                <a:latin typeface="Courier New" panose="02070309020205020404" pitchFamily="49" charset="0"/>
+                <a:cs typeface="Courier New" panose="02070309020205020404" pitchFamily="49" charset="0"/>
+              </a:rPr>
+              <a:t> image', x[0]</a:t>
+            </a:r>
+            <a:br>
+              <a:rPr lang="fr-FR" sz="1200" dirty="0">
+                <a:latin typeface="Courier New" panose="02070309020205020404" pitchFamily="49" charset="0"/>
+                <a:cs typeface="Courier New" panose="02070309020205020404" pitchFamily="49" charset="0"/>
+              </a:rPr>
+            </a:br>
+            <a:r>
+              <a:rPr lang="fr-FR" sz="1200" dirty="0">
+                <a:latin typeface="Courier New" panose="02070309020205020404" pitchFamily="49" charset="0"/>
+                <a:cs typeface="Courier New" panose="02070309020205020404" pitchFamily="49" charset="0"/>
+              </a:rPr>
+              <a:t/>
+            </a:r>
+            <a:br>
+              <a:rPr lang="fr-FR" sz="1200" dirty="0">
+                <a:latin typeface="Courier New" panose="02070309020205020404" pitchFamily="49" charset="0"/>
+                <a:cs typeface="Courier New" panose="02070309020205020404" pitchFamily="49" charset="0"/>
+              </a:rPr>
+            </a:br>
+            <a:r>
+              <a:rPr lang="fr-FR" sz="1200" dirty="0" err="1">
+                <a:latin typeface="Courier New" panose="02070309020205020404" pitchFamily="49" charset="0"/>
+                <a:cs typeface="Courier New" panose="02070309020205020404" pitchFamily="49" charset="0"/>
+              </a:rPr>
+              <a:t>def</a:t>
+            </a:r>
+            <a:r>
+              <a:rPr lang="fr-FR" sz="1200" dirty="0">
+                <a:latin typeface="Courier New" panose="02070309020205020404" pitchFamily="49" charset="0"/>
+                <a:cs typeface="Courier New" panose="02070309020205020404" pitchFamily="49" charset="0"/>
+              </a:rPr>
+              <a:t> </a:t>
+            </a:r>
+            <a:r>
+              <a:rPr lang="fr-FR" sz="1200" dirty="0" err="1">
+                <a:latin typeface="Courier New" panose="02070309020205020404" pitchFamily="49" charset="0"/>
+                <a:cs typeface="Courier New" panose="02070309020205020404" pitchFamily="49" charset="0"/>
+              </a:rPr>
+              <a:t>read_images</a:t>
+            </a:r>
+            <a:r>
+              <a:rPr lang="fr-FR" sz="1200" dirty="0">
+                <a:latin typeface="Courier New" panose="02070309020205020404" pitchFamily="49" charset="0"/>
+                <a:cs typeface="Courier New" panose="02070309020205020404" pitchFamily="49" charset="0"/>
+              </a:rPr>
+              <a:t>(</a:t>
+            </a:r>
+            <a:r>
+              <a:rPr lang="fr-FR" sz="1200" dirty="0" err="1">
+                <a:latin typeface="Courier New" panose="02070309020205020404" pitchFamily="49" charset="0"/>
+                <a:cs typeface="Courier New" panose="02070309020205020404" pitchFamily="49" charset="0"/>
+              </a:rPr>
+              <a:t>spark</a:t>
+            </a:r>
+            <a:r>
+              <a:rPr lang="fr-FR" sz="1200" dirty="0">
+                <a:latin typeface="Courier New" panose="02070309020205020404" pitchFamily="49" charset="0"/>
+                <a:cs typeface="Courier New" panose="02070309020205020404" pitchFamily="49" charset="0"/>
+              </a:rPr>
+              <a:t>):</a:t>
+            </a:r>
+            <a:br>
+              <a:rPr lang="fr-FR" sz="1200" dirty="0">
+                <a:latin typeface="Courier New" panose="02070309020205020404" pitchFamily="49" charset="0"/>
+                <a:cs typeface="Courier New" panose="02070309020205020404" pitchFamily="49" charset="0"/>
+              </a:rPr>
+            </a:br>
+            <a:r>
+              <a:rPr lang="fr-FR" sz="1200" dirty="0">
+                <a:latin typeface="Courier New" panose="02070309020205020404" pitchFamily="49" charset="0"/>
+                <a:cs typeface="Courier New" panose="02070309020205020404" pitchFamily="49" charset="0"/>
+              </a:rPr>
+              <a:t>    </a:t>
+            </a:r>
+            <a:r>
+              <a:rPr lang="fr-FR" sz="1200" dirty="0" err="1">
+                <a:latin typeface="Courier New" panose="02070309020205020404" pitchFamily="49" charset="0"/>
+                <a:cs typeface="Courier New" panose="02070309020205020404" pitchFamily="49" charset="0"/>
+              </a:rPr>
+              <a:t>df</a:t>
+            </a:r>
+            <a:r>
+              <a:rPr lang="fr-FR" sz="1200" dirty="0">
+                <a:latin typeface="Courier New" panose="02070309020205020404" pitchFamily="49" charset="0"/>
+                <a:cs typeface="Courier New" panose="02070309020205020404" pitchFamily="49" charset="0"/>
+              </a:rPr>
+              <a:t> = </a:t>
+            </a:r>
+            <a:r>
+              <a:rPr lang="fr-FR" sz="1200" dirty="0" err="1">
+                <a:latin typeface="Courier New" panose="02070309020205020404" pitchFamily="49" charset="0"/>
+                <a:cs typeface="Courier New" panose="02070309020205020404" pitchFamily="49" charset="0"/>
+              </a:rPr>
+              <a:t>spark.read.format</a:t>
+            </a:r>
+            <a:r>
+              <a:rPr lang="fr-FR" sz="1200" dirty="0">
+                <a:latin typeface="Courier New" panose="02070309020205020404" pitchFamily="49" charset="0"/>
+                <a:cs typeface="Courier New" panose="02070309020205020404" pitchFamily="49" charset="0"/>
+              </a:rPr>
+              <a:t>("</a:t>
+            </a:r>
+            <a:r>
+              <a:rPr lang="fr-FR" sz="1200" dirty="0" err="1">
+                <a:latin typeface="Courier New" panose="02070309020205020404" pitchFamily="49" charset="0"/>
+                <a:cs typeface="Courier New" panose="02070309020205020404" pitchFamily="49" charset="0"/>
+              </a:rPr>
+              <a:t>com.databricks.spark.avro</a:t>
+            </a:r>
+            <a:r>
+              <a:rPr lang="fr-FR" sz="1200" dirty="0">
+                <a:latin typeface="Courier New" panose="02070309020205020404" pitchFamily="49" charset="0"/>
+                <a:cs typeface="Courier New" panose="02070309020205020404" pitchFamily="49" charset="0"/>
+              </a:rPr>
+              <a:t>").</a:t>
+            </a:r>
+            <a:r>
+              <a:rPr lang="fr-FR" sz="1200" dirty="0" err="1">
+                <a:latin typeface="Courier New" panose="02070309020205020404" pitchFamily="49" charset="0"/>
+                <a:cs typeface="Courier New" panose="02070309020205020404" pitchFamily="49" charset="0"/>
+              </a:rPr>
+              <a:t>load</a:t>
+            </a:r>
+            <a:r>
+              <a:rPr lang="fr-FR" sz="1200" dirty="0">
+                <a:latin typeface="Courier New" panose="02070309020205020404" pitchFamily="49" charset="0"/>
+                <a:cs typeface="Courier New" panose="02070309020205020404" pitchFamily="49" charset="0"/>
+              </a:rPr>
+              <a:t>("./images")</a:t>
+            </a:r>
+            <a:br>
+              <a:rPr lang="fr-FR" sz="1200" dirty="0">
+                <a:latin typeface="Courier New" panose="02070309020205020404" pitchFamily="49" charset="0"/>
+                <a:cs typeface="Courier New" panose="02070309020205020404" pitchFamily="49" charset="0"/>
+              </a:rPr>
+            </a:br>
+            <a:r>
+              <a:rPr lang="fr-FR" sz="1200" dirty="0">
+                <a:latin typeface="Courier New" panose="02070309020205020404" pitchFamily="49" charset="0"/>
+                <a:cs typeface="Courier New" panose="02070309020205020404" pitchFamily="49" charset="0"/>
+              </a:rPr>
+              <a:t/>
+            </a:r>
+            <a:br>
+              <a:rPr lang="fr-FR" sz="1200" dirty="0">
+                <a:latin typeface="Courier New" panose="02070309020205020404" pitchFamily="49" charset="0"/>
+                <a:cs typeface="Courier New" panose="02070309020205020404" pitchFamily="49" charset="0"/>
+              </a:rPr>
+            </a:br>
+            <a:r>
+              <a:rPr lang="fr-FR" sz="1200" dirty="0">
+                <a:latin typeface="Courier New" panose="02070309020205020404" pitchFamily="49" charset="0"/>
+                <a:cs typeface="Courier New" panose="02070309020205020404" pitchFamily="49" charset="0"/>
+              </a:rPr>
+              <a:t>    </a:t>
+            </a:r>
+            <a:r>
+              <a:rPr lang="fr-FR" sz="1200" dirty="0" err="1" smtClean="0">
+                <a:latin typeface="Courier New" panose="02070309020205020404" pitchFamily="49" charset="0"/>
+                <a:cs typeface="Courier New" panose="02070309020205020404" pitchFamily="49" charset="0"/>
+              </a:rPr>
+              <a:t>rdd</a:t>
+            </a:r>
+            <a:r>
+              <a:rPr lang="fr-FR" sz="1200" dirty="0" smtClean="0">
+                <a:latin typeface="Courier New" panose="02070309020205020404" pitchFamily="49" charset="0"/>
+                <a:cs typeface="Courier New" panose="02070309020205020404" pitchFamily="49" charset="0"/>
+              </a:rPr>
+              <a:t> </a:t>
+            </a:r>
+            <a:r>
+              <a:rPr lang="fr-FR" sz="1200" dirty="0">
+                <a:latin typeface="Courier New" panose="02070309020205020404" pitchFamily="49" charset="0"/>
+                <a:cs typeface="Courier New" panose="02070309020205020404" pitchFamily="49" charset="0"/>
+              </a:rPr>
+              <a:t>= </a:t>
+            </a:r>
+            <a:r>
+              <a:rPr lang="fr-FR" sz="1200" dirty="0" err="1">
+                <a:latin typeface="Courier New" panose="02070309020205020404" pitchFamily="49" charset="0"/>
+                <a:cs typeface="Courier New" panose="02070309020205020404" pitchFamily="49" charset="0"/>
+              </a:rPr>
+              <a:t>df.rdd.map</a:t>
+            </a:r>
+            <a:r>
+              <a:rPr lang="fr-FR" sz="1200" dirty="0">
+                <a:latin typeface="Courier New" panose="02070309020205020404" pitchFamily="49" charset="0"/>
+                <a:cs typeface="Courier New" panose="02070309020205020404" pitchFamily="49" charset="0"/>
+              </a:rPr>
+              <a:t>(lambda x: </a:t>
+            </a:r>
+            <a:r>
+              <a:rPr lang="fr-FR" sz="1200" dirty="0" err="1" smtClean="0">
+                <a:latin typeface="Courier New" panose="02070309020205020404" pitchFamily="49" charset="0"/>
+                <a:cs typeface="Courier New" panose="02070309020205020404" pitchFamily="49" charset="0"/>
+              </a:rPr>
+              <a:t>analyze</a:t>
+            </a:r>
+            <a:r>
+              <a:rPr lang="fr-FR" sz="1200" dirty="0" smtClean="0">
+                <a:latin typeface="Courier New" panose="02070309020205020404" pitchFamily="49" charset="0"/>
+                <a:cs typeface="Courier New" panose="02070309020205020404" pitchFamily="49" charset="0"/>
+              </a:rPr>
+              <a:t>(x))</a:t>
+            </a:r>
+            <a:r>
+              <a:rPr lang="fr-FR" sz="1200" dirty="0">
+                <a:latin typeface="Courier New" panose="02070309020205020404" pitchFamily="49" charset="0"/>
+                <a:cs typeface="Courier New" panose="02070309020205020404" pitchFamily="49" charset="0"/>
+              </a:rPr>
+              <a:t/>
+            </a:r>
+            <a:br>
+              <a:rPr lang="fr-FR" sz="1200" dirty="0">
+                <a:latin typeface="Courier New" panose="02070309020205020404" pitchFamily="49" charset="0"/>
+                <a:cs typeface="Courier New" panose="02070309020205020404" pitchFamily="49" charset="0"/>
+              </a:rPr>
+            </a:br>
+            <a:r>
+              <a:rPr lang="fr-FR" sz="1200" dirty="0">
+                <a:latin typeface="Courier New" panose="02070309020205020404" pitchFamily="49" charset="0"/>
+                <a:cs typeface="Courier New" panose="02070309020205020404" pitchFamily="49" charset="0"/>
+              </a:rPr>
+              <a:t/>
+            </a:r>
+            <a:br>
+              <a:rPr lang="fr-FR" sz="1200" dirty="0">
+                <a:latin typeface="Courier New" panose="02070309020205020404" pitchFamily="49" charset="0"/>
+                <a:cs typeface="Courier New" panose="02070309020205020404" pitchFamily="49" charset="0"/>
+              </a:rPr>
+            </a:br>
+            <a:r>
+              <a:rPr lang="fr-FR" sz="1200" dirty="0">
+                <a:latin typeface="Courier New" panose="02070309020205020404" pitchFamily="49" charset="0"/>
+                <a:cs typeface="Courier New" panose="02070309020205020404" pitchFamily="49" charset="0"/>
+              </a:rPr>
+              <a:t>    </a:t>
+            </a:r>
+            <a:r>
+              <a:rPr lang="fr-FR" sz="1200" dirty="0" err="1">
+                <a:latin typeface="Courier New" panose="02070309020205020404" pitchFamily="49" charset="0"/>
+                <a:cs typeface="Courier New" panose="02070309020205020404" pitchFamily="49" charset="0"/>
+              </a:rPr>
+              <a:t>result</a:t>
+            </a:r>
+            <a:r>
+              <a:rPr lang="fr-FR" sz="1200" dirty="0">
+                <a:latin typeface="Courier New" panose="02070309020205020404" pitchFamily="49" charset="0"/>
+                <a:cs typeface="Courier New" panose="02070309020205020404" pitchFamily="49" charset="0"/>
+              </a:rPr>
+              <a:t> = </a:t>
+            </a:r>
+            <a:r>
+              <a:rPr lang="fr-FR" sz="1200" dirty="0" err="1" smtClean="0">
+                <a:latin typeface="Courier New" panose="02070309020205020404" pitchFamily="49" charset="0"/>
+                <a:cs typeface="Courier New" panose="02070309020205020404" pitchFamily="49" charset="0"/>
+              </a:rPr>
+              <a:t>rdd.collect</a:t>
+            </a:r>
+            <a:r>
+              <a:rPr lang="fr-FR" sz="1200" dirty="0">
+                <a:latin typeface="Courier New" panose="02070309020205020404" pitchFamily="49" charset="0"/>
+                <a:cs typeface="Courier New" panose="02070309020205020404" pitchFamily="49" charset="0"/>
+              </a:rPr>
+              <a:t>()</a:t>
+            </a:r>
+            <a:br>
+              <a:rPr lang="fr-FR" sz="1200" dirty="0">
+                <a:latin typeface="Courier New" panose="02070309020205020404" pitchFamily="49" charset="0"/>
+                <a:cs typeface="Courier New" panose="02070309020205020404" pitchFamily="49" charset="0"/>
+              </a:rPr>
+            </a:br>
+            <a:r>
+              <a:rPr lang="fr-FR" sz="1200" dirty="0">
+                <a:latin typeface="Courier New" panose="02070309020205020404" pitchFamily="49" charset="0"/>
+                <a:cs typeface="Courier New" panose="02070309020205020404" pitchFamily="49" charset="0"/>
+              </a:rPr>
+              <a:t>    </a:t>
+            </a:r>
+            <a:r>
+              <a:rPr lang="fr-FR" sz="1200" dirty="0" err="1">
+                <a:latin typeface="Courier New" panose="02070309020205020404" pitchFamily="49" charset="0"/>
+                <a:cs typeface="Courier New" panose="02070309020205020404" pitchFamily="49" charset="0"/>
+              </a:rPr>
+              <a:t>print</a:t>
+            </a:r>
+            <a:r>
+              <a:rPr lang="fr-FR" sz="1200" dirty="0">
+                <a:latin typeface="Courier New" panose="02070309020205020404" pitchFamily="49" charset="0"/>
+                <a:cs typeface="Courier New" panose="02070309020205020404" pitchFamily="49" charset="0"/>
+              </a:rPr>
+              <a:t>(</a:t>
+            </a:r>
+            <a:r>
+              <a:rPr lang="fr-FR" sz="1200" dirty="0" err="1">
+                <a:latin typeface="Courier New" panose="02070309020205020404" pitchFamily="49" charset="0"/>
+                <a:cs typeface="Courier New" panose="02070309020205020404" pitchFamily="49" charset="0"/>
+              </a:rPr>
+              <a:t>result</a:t>
+            </a:r>
+            <a:r>
+              <a:rPr lang="fr-FR" sz="1200" dirty="0">
+                <a:latin typeface="Courier New" panose="02070309020205020404" pitchFamily="49" charset="0"/>
+                <a:cs typeface="Courier New" panose="02070309020205020404" pitchFamily="49" charset="0"/>
+              </a:rPr>
+              <a:t>)</a:t>
+            </a:r>
+            <a:endParaRPr lang="fr-FR" sz="1200" dirty="0" smtClean="0">
+              <a:latin typeface="Courier New" panose="02070309020205020404" pitchFamily="49" charset="0"/>
+              <a:cs typeface="Courier New" panose="02070309020205020404" pitchFamily="49" charset="0"/>
+            </a:endParaRPr>
+          </a:p>
+        </p:txBody>
+      </p:sp>
+    </p:spTree>
+    <p:extLst>
+      <p:ext uri="{BB962C8B-B14F-4D97-AF65-F5344CB8AC3E}">
+        <p14:creationId xmlns:p14="http://schemas.microsoft.com/office/powerpoint/2010/main" val="2659078028"/>
+      </p:ext>
+    </p:extLst>
+  </p:cSld>
+  <p:clrMapOvr>
+    <a:masterClrMapping/>
+  </p:clrMapOvr>
+  <p:timing>
+    <p:tnLst>
+      <p:par>
+        <p:cTn id="1" dur="indefinite" restart="never" nodeType="tmRoot"/>
+      </p:par>
+    </p:tnLst>
+  </p:timing>
+</p:sld>
+</file>
+
+<file path=ppt/slides/slide12.xml><?xml version="1.0" encoding="utf-8"?>
+<p:sld xmlns:a="http://schemas.openxmlformats.org/drawingml/2006/main" xmlns:r="http://schemas.openxmlformats.org/officeDocument/2006/relationships" xmlns:p="http://schemas.openxmlformats.org/presentationml/2006/main">
+  <p:cSld>
+    <p:spTree>
+      <p:nvGrpSpPr>
+        <p:cNvPr id="1" name=""/>
+        <p:cNvGrpSpPr/>
+        <p:nvPr/>
+      </p:nvGrpSpPr>
+      <p:grpSpPr>
+        <a:xfrm>
+          <a:off x="0" y="0"/>
+          <a:ext cx="0" cy="0"/>
+          <a:chOff x="0" y="0"/>
+          <a:chExt cx="0" cy="0"/>
+        </a:xfrm>
+      </p:grpSpPr>
+      <p:sp>
+        <p:nvSpPr>
+          <p:cNvPr id="2" name="Titre 1"/>
+          <p:cNvSpPr>
+            <a:spLocks noGrp="1"/>
+          </p:cNvSpPr>
+          <p:nvPr>
+            <p:ph type="title"/>
+          </p:nvPr>
+        </p:nvSpPr>
+        <p:spPr/>
+        <p:txBody>
+          <a:bodyPr>
+            <a:normAutofit fontScale="90000"/>
+          </a:bodyPr>
+          <a:lstStyle/>
+          <a:p>
+            <a:r>
+              <a:rPr lang="fr-FR" dirty="0" err="1" smtClean="0"/>
+              <a:t>MongoDB</a:t>
+            </a:r>
+            <a:endParaRPr lang="fr-FR" dirty="0"/>
+          </a:p>
+        </p:txBody>
+      </p:sp>
+      <p:sp>
+        <p:nvSpPr>
+          <p:cNvPr id="4" name="ZoneTexte 3"/>
+          <p:cNvSpPr txBox="1"/>
+          <p:nvPr/>
+        </p:nvSpPr>
+        <p:spPr>
+          <a:xfrm>
+            <a:off x="683568" y="1124744"/>
+            <a:ext cx="6692858" cy="3416320"/>
+          </a:xfrm>
+          <a:prstGeom prst="rect">
+            <a:avLst/>
+          </a:prstGeom>
+          <a:solidFill>
+            <a:schemeClr val="bg1">
+              <a:lumMod val="95000"/>
+            </a:schemeClr>
+          </a:solidFill>
+          <a:ln>
+            <a:solidFill>
+              <a:srgbClr val="0070C0"/>
+            </a:solidFill>
+          </a:ln>
+        </p:spPr>
+        <p:txBody>
+          <a:bodyPr wrap="none" rtlCol="0">
+            <a:spAutoFit/>
+          </a:bodyPr>
+          <a:lstStyle/>
+          <a:p>
+            <a:r>
+              <a:rPr lang="fr-FR" sz="1200" dirty="0" smtClean="0">
+                <a:latin typeface="Courier New" panose="02070309020205020404" pitchFamily="49" charset="0"/>
+                <a:cs typeface="Courier New" panose="02070309020205020404" pitchFamily="49" charset="0"/>
+              </a:rPr>
+              <a:t>client </a:t>
+            </a:r>
+            <a:r>
+              <a:rPr lang="fr-FR" sz="1200" dirty="0">
+                <a:latin typeface="Courier New" panose="02070309020205020404" pitchFamily="49" charset="0"/>
+                <a:cs typeface="Courier New" panose="02070309020205020404" pitchFamily="49" charset="0"/>
+              </a:rPr>
+              <a:t>= </a:t>
+            </a:r>
+            <a:r>
+              <a:rPr lang="fr-FR" sz="1200" dirty="0" err="1">
+                <a:latin typeface="Courier New" panose="02070309020205020404" pitchFamily="49" charset="0"/>
+                <a:cs typeface="Courier New" panose="02070309020205020404" pitchFamily="49" charset="0"/>
+              </a:rPr>
+              <a:t>pymongo.MongoClient</a:t>
+            </a:r>
+            <a:r>
+              <a:rPr lang="fr-FR" sz="1200" dirty="0">
+                <a:latin typeface="Courier New" panose="02070309020205020404" pitchFamily="49" charset="0"/>
+                <a:cs typeface="Courier New" panose="02070309020205020404" pitchFamily="49" charset="0"/>
+              </a:rPr>
+              <a:t>(MONGO_URL)</a:t>
+            </a:r>
+          </a:p>
+          <a:p>
+            <a:r>
+              <a:rPr lang="fr-FR" sz="1200" dirty="0" err="1">
+                <a:latin typeface="Courier New" panose="02070309020205020404" pitchFamily="49" charset="0"/>
+                <a:cs typeface="Courier New" panose="02070309020205020404" pitchFamily="49" charset="0"/>
+              </a:rPr>
+              <a:t>lsst</a:t>
+            </a:r>
+            <a:r>
+              <a:rPr lang="fr-FR" sz="1200" dirty="0">
+                <a:latin typeface="Courier New" panose="02070309020205020404" pitchFamily="49" charset="0"/>
+                <a:cs typeface="Courier New" panose="02070309020205020404" pitchFamily="49" charset="0"/>
+              </a:rPr>
+              <a:t> = </a:t>
+            </a:r>
+            <a:r>
+              <a:rPr lang="fr-FR" sz="1200" dirty="0" err="1">
+                <a:latin typeface="Courier New" panose="02070309020205020404" pitchFamily="49" charset="0"/>
+                <a:cs typeface="Courier New" panose="02070309020205020404" pitchFamily="49" charset="0"/>
+              </a:rPr>
+              <a:t>client.lsst</a:t>
+            </a:r>
+            <a:endParaRPr lang="fr-FR" sz="1200" dirty="0">
+              <a:latin typeface="Courier New" panose="02070309020205020404" pitchFamily="49" charset="0"/>
+              <a:cs typeface="Courier New" panose="02070309020205020404" pitchFamily="49" charset="0"/>
+            </a:endParaRPr>
+          </a:p>
+          <a:p>
+            <a:endParaRPr lang="fr-FR" sz="1200" dirty="0">
+              <a:latin typeface="Courier New" panose="02070309020205020404" pitchFamily="49" charset="0"/>
+              <a:cs typeface="Courier New" panose="02070309020205020404" pitchFamily="49" charset="0"/>
+            </a:endParaRPr>
+          </a:p>
+          <a:p>
+            <a:r>
+              <a:rPr lang="fr-FR" sz="1200" dirty="0" smtClean="0">
+                <a:latin typeface="Courier New" panose="02070309020205020404" pitchFamily="49" charset="0"/>
+                <a:cs typeface="Courier New" panose="02070309020205020404" pitchFamily="49" charset="0"/>
+              </a:rPr>
+              <a:t>stars </a:t>
+            </a:r>
+            <a:r>
+              <a:rPr lang="fr-FR" sz="1200" dirty="0">
+                <a:latin typeface="Courier New" panose="02070309020205020404" pitchFamily="49" charset="0"/>
+                <a:cs typeface="Courier New" panose="02070309020205020404" pitchFamily="49" charset="0"/>
+              </a:rPr>
+              <a:t>= </a:t>
+            </a:r>
+            <a:r>
+              <a:rPr lang="fr-FR" sz="1200" dirty="0" err="1">
+                <a:latin typeface="Courier New" panose="02070309020205020404" pitchFamily="49" charset="0"/>
+                <a:cs typeface="Courier New" panose="02070309020205020404" pitchFamily="49" charset="0"/>
+              </a:rPr>
+              <a:t>lsst.stars</a:t>
+            </a:r>
+            <a:endParaRPr lang="fr-FR" sz="1200" dirty="0">
+              <a:latin typeface="Courier New" panose="02070309020205020404" pitchFamily="49" charset="0"/>
+              <a:cs typeface="Courier New" panose="02070309020205020404" pitchFamily="49" charset="0"/>
+            </a:endParaRPr>
+          </a:p>
+          <a:p>
+            <a:endParaRPr lang="fr-FR" sz="1200" dirty="0">
+              <a:latin typeface="Courier New" panose="02070309020205020404" pitchFamily="49" charset="0"/>
+              <a:cs typeface="Courier New" panose="02070309020205020404" pitchFamily="49" charset="0"/>
+            </a:endParaRPr>
+          </a:p>
+          <a:p>
+            <a:r>
+              <a:rPr lang="fr-FR" sz="1200" dirty="0">
+                <a:latin typeface="Courier New" panose="02070309020205020404" pitchFamily="49" charset="0"/>
+                <a:cs typeface="Courier New" panose="02070309020205020404" pitchFamily="49" charset="0"/>
+              </a:rPr>
+              <a:t>for </a:t>
+            </a:r>
+            <a:r>
+              <a:rPr lang="fr-FR" sz="1200" dirty="0" err="1">
+                <a:latin typeface="Courier New" panose="02070309020205020404" pitchFamily="49" charset="0"/>
+                <a:cs typeface="Courier New" panose="02070309020205020404" pitchFamily="49" charset="0"/>
+              </a:rPr>
+              <a:t>o_id</a:t>
+            </a:r>
+            <a:r>
+              <a:rPr lang="fr-FR" sz="1200" dirty="0">
+                <a:latin typeface="Courier New" panose="02070309020205020404" pitchFamily="49" charset="0"/>
+                <a:cs typeface="Courier New" panose="02070309020205020404" pitchFamily="49" charset="0"/>
+              </a:rPr>
+              <a:t> in </a:t>
+            </a:r>
+            <a:r>
+              <a:rPr lang="fr-FR" sz="1200" dirty="0" err="1">
+                <a:latin typeface="Courier New" panose="02070309020205020404" pitchFamily="49" charset="0"/>
+                <a:cs typeface="Courier New" panose="02070309020205020404" pitchFamily="49" charset="0"/>
+              </a:rPr>
+              <a:t>objects</a:t>
+            </a:r>
+            <a:r>
+              <a:rPr lang="fr-FR" sz="1200" dirty="0">
+                <a:latin typeface="Courier New" panose="02070309020205020404" pitchFamily="49" charset="0"/>
+                <a:cs typeface="Courier New" panose="02070309020205020404" pitchFamily="49" charset="0"/>
+              </a:rPr>
+              <a:t>:</a:t>
+            </a:r>
+          </a:p>
+          <a:p>
+            <a:r>
+              <a:rPr lang="fr-FR" sz="1200" dirty="0">
+                <a:latin typeface="Courier New" panose="02070309020205020404" pitchFamily="49" charset="0"/>
+                <a:cs typeface="Courier New" panose="02070309020205020404" pitchFamily="49" charset="0"/>
+              </a:rPr>
+              <a:t>    o = </a:t>
+            </a:r>
+            <a:r>
+              <a:rPr lang="fr-FR" sz="1200" dirty="0" err="1">
+                <a:latin typeface="Courier New" panose="02070309020205020404" pitchFamily="49" charset="0"/>
+                <a:cs typeface="Courier New" panose="02070309020205020404" pitchFamily="49" charset="0"/>
+              </a:rPr>
+              <a:t>objects</a:t>
+            </a:r>
+            <a:r>
+              <a:rPr lang="fr-FR" sz="1200" dirty="0">
+                <a:latin typeface="Courier New" panose="02070309020205020404" pitchFamily="49" charset="0"/>
+                <a:cs typeface="Courier New" panose="02070309020205020404" pitchFamily="49" charset="0"/>
+              </a:rPr>
+              <a:t>[</a:t>
+            </a:r>
+            <a:r>
+              <a:rPr lang="fr-FR" sz="1200" dirty="0" err="1">
+                <a:latin typeface="Courier New" panose="02070309020205020404" pitchFamily="49" charset="0"/>
+                <a:cs typeface="Courier New" panose="02070309020205020404" pitchFamily="49" charset="0"/>
+              </a:rPr>
+              <a:t>o_id</a:t>
+            </a:r>
+            <a:r>
+              <a:rPr lang="fr-FR" sz="1200" dirty="0">
+                <a:latin typeface="Courier New" panose="02070309020205020404" pitchFamily="49" charset="0"/>
+                <a:cs typeface="Courier New" panose="02070309020205020404" pitchFamily="49" charset="0"/>
+              </a:rPr>
+              <a:t>]</a:t>
+            </a:r>
+          </a:p>
+          <a:p>
+            <a:endParaRPr lang="fr-FR" sz="1200" dirty="0">
+              <a:latin typeface="Courier New" panose="02070309020205020404" pitchFamily="49" charset="0"/>
+              <a:cs typeface="Courier New" panose="02070309020205020404" pitchFamily="49" charset="0"/>
+            </a:endParaRPr>
+          </a:p>
+          <a:p>
+            <a:r>
+              <a:rPr lang="fr-FR" sz="1200" dirty="0">
+                <a:latin typeface="Courier New" panose="02070309020205020404" pitchFamily="49" charset="0"/>
+                <a:cs typeface="Courier New" panose="02070309020205020404" pitchFamily="49" charset="0"/>
+              </a:rPr>
+              <a:t>    </a:t>
+            </a:r>
+            <a:r>
+              <a:rPr lang="fr-FR" sz="1200" dirty="0" err="1">
+                <a:latin typeface="Courier New" panose="02070309020205020404" pitchFamily="49" charset="0"/>
+                <a:cs typeface="Courier New" panose="02070309020205020404" pitchFamily="49" charset="0"/>
+              </a:rPr>
+              <a:t>object</a:t>
+            </a:r>
+            <a:r>
+              <a:rPr lang="fr-FR" sz="1200" dirty="0">
+                <a:latin typeface="Courier New" panose="02070309020205020404" pitchFamily="49" charset="0"/>
+                <a:cs typeface="Courier New" panose="02070309020205020404" pitchFamily="49" charset="0"/>
+              </a:rPr>
+              <a:t> = </a:t>
+            </a:r>
+            <a:r>
+              <a:rPr lang="fr-FR" sz="1200" dirty="0" err="1">
+                <a:latin typeface="Courier New" panose="02070309020205020404" pitchFamily="49" charset="0"/>
+                <a:cs typeface="Courier New" panose="02070309020205020404" pitchFamily="49" charset="0"/>
+              </a:rPr>
+              <a:t>o.to_db</a:t>
+            </a:r>
+            <a:r>
+              <a:rPr lang="fr-FR" sz="1200" dirty="0">
+                <a:latin typeface="Courier New" panose="02070309020205020404" pitchFamily="49" charset="0"/>
+                <a:cs typeface="Courier New" panose="02070309020205020404" pitchFamily="49" charset="0"/>
+              </a:rPr>
+              <a:t>()</a:t>
+            </a:r>
+          </a:p>
+          <a:p>
+            <a:endParaRPr lang="fr-FR" sz="1200" dirty="0">
+              <a:latin typeface="Courier New" panose="02070309020205020404" pitchFamily="49" charset="0"/>
+              <a:cs typeface="Courier New" panose="02070309020205020404" pitchFamily="49" charset="0"/>
+            </a:endParaRPr>
+          </a:p>
+          <a:p>
+            <a:r>
+              <a:rPr lang="fr-FR" sz="1200" dirty="0">
+                <a:latin typeface="Courier New" panose="02070309020205020404" pitchFamily="49" charset="0"/>
+                <a:cs typeface="Courier New" panose="02070309020205020404" pitchFamily="49" charset="0"/>
+              </a:rPr>
+              <a:t>    </a:t>
+            </a:r>
+            <a:r>
+              <a:rPr lang="fr-FR" sz="1200" dirty="0" err="1">
+                <a:latin typeface="Courier New" panose="02070309020205020404" pitchFamily="49" charset="0"/>
+                <a:cs typeface="Courier New" panose="02070309020205020404" pitchFamily="49" charset="0"/>
+              </a:rPr>
+              <a:t>object</a:t>
+            </a:r>
+            <a:r>
+              <a:rPr lang="fr-FR" sz="1200" dirty="0">
+                <a:latin typeface="Courier New" panose="02070309020205020404" pitchFamily="49" charset="0"/>
+                <a:cs typeface="Courier New" panose="02070309020205020404" pitchFamily="49" charset="0"/>
+              </a:rPr>
+              <a:t>['center'] = {'type': 'Point', '</a:t>
+            </a:r>
+            <a:r>
+              <a:rPr lang="fr-FR" sz="1200" dirty="0" err="1">
+                <a:latin typeface="Courier New" panose="02070309020205020404" pitchFamily="49" charset="0"/>
+                <a:cs typeface="Courier New" panose="02070309020205020404" pitchFamily="49" charset="0"/>
+              </a:rPr>
+              <a:t>coordinates</a:t>
+            </a:r>
+            <a:r>
+              <a:rPr lang="fr-FR" sz="1200" dirty="0">
+                <a:latin typeface="Courier New" panose="02070309020205020404" pitchFamily="49" charset="0"/>
+                <a:cs typeface="Courier New" panose="02070309020205020404" pitchFamily="49" charset="0"/>
+              </a:rPr>
+              <a:t>': [</a:t>
+            </a:r>
+            <a:r>
+              <a:rPr lang="fr-FR" sz="1200" dirty="0" err="1">
+                <a:latin typeface="Courier New" panose="02070309020205020404" pitchFamily="49" charset="0"/>
+                <a:cs typeface="Courier New" panose="02070309020205020404" pitchFamily="49" charset="0"/>
+              </a:rPr>
+              <a:t>o.ra</a:t>
+            </a:r>
+            <a:r>
+              <a:rPr lang="fr-FR" sz="1200" dirty="0">
+                <a:latin typeface="Courier New" panose="02070309020205020404" pitchFamily="49" charset="0"/>
+                <a:cs typeface="Courier New" panose="02070309020205020404" pitchFamily="49" charset="0"/>
+              </a:rPr>
+              <a:t>, </a:t>
+            </a:r>
+            <a:r>
+              <a:rPr lang="fr-FR" sz="1200" dirty="0" err="1">
+                <a:latin typeface="Courier New" panose="02070309020205020404" pitchFamily="49" charset="0"/>
+                <a:cs typeface="Courier New" panose="02070309020205020404" pitchFamily="49" charset="0"/>
+              </a:rPr>
+              <a:t>o.dec</a:t>
+            </a:r>
+            <a:r>
+              <a:rPr lang="fr-FR" sz="1200" dirty="0">
+                <a:latin typeface="Courier New" panose="02070309020205020404" pitchFamily="49" charset="0"/>
+                <a:cs typeface="Courier New" panose="02070309020205020404" pitchFamily="49" charset="0"/>
+              </a:rPr>
+              <a:t>]}</a:t>
+            </a:r>
+          </a:p>
+          <a:p>
+            <a:r>
+              <a:rPr lang="fr-FR" sz="1200" dirty="0">
+                <a:latin typeface="Courier New" panose="02070309020205020404" pitchFamily="49" charset="0"/>
+                <a:cs typeface="Courier New" panose="02070309020205020404" pitchFamily="49" charset="0"/>
+              </a:rPr>
+              <a:t>    </a:t>
+            </a:r>
+            <a:r>
+              <a:rPr lang="fr-FR" sz="1200" dirty="0" err="1">
+                <a:latin typeface="Courier New" panose="02070309020205020404" pitchFamily="49" charset="0"/>
+                <a:cs typeface="Courier New" panose="02070309020205020404" pitchFamily="49" charset="0"/>
+              </a:rPr>
+              <a:t>try</a:t>
+            </a:r>
+            <a:r>
+              <a:rPr lang="fr-FR" sz="1200" dirty="0">
+                <a:latin typeface="Courier New" panose="02070309020205020404" pitchFamily="49" charset="0"/>
+                <a:cs typeface="Courier New" panose="02070309020205020404" pitchFamily="49" charset="0"/>
+              </a:rPr>
+              <a:t>:</a:t>
+            </a:r>
+          </a:p>
+          <a:p>
+            <a:r>
+              <a:rPr lang="fr-FR" sz="1200" dirty="0">
+                <a:latin typeface="Courier New" panose="02070309020205020404" pitchFamily="49" charset="0"/>
+                <a:cs typeface="Courier New" panose="02070309020205020404" pitchFamily="49" charset="0"/>
+              </a:rPr>
+              <a:t>        id = </a:t>
+            </a:r>
+            <a:r>
+              <a:rPr lang="fr-FR" sz="1200" dirty="0" err="1">
+                <a:latin typeface="Courier New" panose="02070309020205020404" pitchFamily="49" charset="0"/>
+                <a:cs typeface="Courier New" panose="02070309020205020404" pitchFamily="49" charset="0"/>
+              </a:rPr>
+              <a:t>stars.insert_one</a:t>
+            </a:r>
+            <a:r>
+              <a:rPr lang="fr-FR" sz="1200" dirty="0">
+                <a:latin typeface="Courier New" panose="02070309020205020404" pitchFamily="49" charset="0"/>
+                <a:cs typeface="Courier New" panose="02070309020205020404" pitchFamily="49" charset="0"/>
+              </a:rPr>
+              <a:t>(</a:t>
+            </a:r>
+            <a:r>
+              <a:rPr lang="fr-FR" sz="1200" dirty="0" err="1">
+                <a:latin typeface="Courier New" panose="02070309020205020404" pitchFamily="49" charset="0"/>
+                <a:cs typeface="Courier New" panose="02070309020205020404" pitchFamily="49" charset="0"/>
+              </a:rPr>
+              <a:t>object</a:t>
+            </a:r>
+            <a:r>
+              <a:rPr lang="fr-FR" sz="1200" dirty="0">
+                <a:latin typeface="Courier New" panose="02070309020205020404" pitchFamily="49" charset="0"/>
+                <a:cs typeface="Courier New" panose="02070309020205020404" pitchFamily="49" charset="0"/>
+              </a:rPr>
+              <a:t>)</a:t>
+            </a:r>
+          </a:p>
+          <a:p>
+            <a:r>
+              <a:rPr lang="fr-FR" sz="1200" dirty="0" smtClean="0">
+                <a:latin typeface="Courier New" panose="02070309020205020404" pitchFamily="49" charset="0"/>
+                <a:cs typeface="Courier New" panose="02070309020205020404" pitchFamily="49" charset="0"/>
+              </a:rPr>
+              <a:t>    </a:t>
+            </a:r>
+            <a:r>
+              <a:rPr lang="fr-FR" sz="1200" dirty="0" err="1" smtClean="0">
+                <a:latin typeface="Courier New" panose="02070309020205020404" pitchFamily="49" charset="0"/>
+                <a:cs typeface="Courier New" panose="02070309020205020404" pitchFamily="49" charset="0"/>
+              </a:rPr>
+              <a:t>except</a:t>
+            </a:r>
+            <a:r>
+              <a:rPr lang="fr-FR" sz="1200" dirty="0" smtClean="0">
+                <a:latin typeface="Courier New" panose="02070309020205020404" pitchFamily="49" charset="0"/>
+                <a:cs typeface="Courier New" panose="02070309020205020404" pitchFamily="49" charset="0"/>
+              </a:rPr>
+              <a:t> </a:t>
+            </a:r>
+            <a:r>
+              <a:rPr lang="fr-FR" sz="1200" dirty="0">
+                <a:latin typeface="Courier New" panose="02070309020205020404" pitchFamily="49" charset="0"/>
+                <a:cs typeface="Courier New" panose="02070309020205020404" pitchFamily="49" charset="0"/>
+              </a:rPr>
+              <a:t>Exception as e:</a:t>
+            </a:r>
+          </a:p>
+          <a:p>
+            <a:r>
+              <a:rPr lang="fr-FR" sz="1200" dirty="0" smtClean="0">
+                <a:latin typeface="Courier New" panose="02070309020205020404" pitchFamily="49" charset="0"/>
+                <a:cs typeface="Courier New" panose="02070309020205020404" pitchFamily="49" charset="0"/>
+              </a:rPr>
+              <a:t>        </a:t>
+            </a:r>
+            <a:r>
+              <a:rPr lang="fr-FR" sz="1200" dirty="0" err="1" smtClean="0">
+                <a:latin typeface="Courier New" panose="02070309020205020404" pitchFamily="49" charset="0"/>
+                <a:cs typeface="Courier New" panose="02070309020205020404" pitchFamily="49" charset="0"/>
+              </a:rPr>
+              <a:t>print</a:t>
+            </a:r>
+            <a:r>
+              <a:rPr lang="fr-FR" sz="1200" dirty="0" smtClean="0">
+                <a:latin typeface="Courier New" panose="02070309020205020404" pitchFamily="49" charset="0"/>
+                <a:cs typeface="Courier New" panose="02070309020205020404" pitchFamily="49" charset="0"/>
+              </a:rPr>
+              <a:t>(</a:t>
+            </a:r>
+            <a:r>
+              <a:rPr lang="fr-FR" sz="1200" dirty="0" err="1" smtClean="0">
+                <a:latin typeface="Courier New" panose="02070309020205020404" pitchFamily="49" charset="0"/>
+                <a:cs typeface="Courier New" panose="02070309020205020404" pitchFamily="49" charset="0"/>
+              </a:rPr>
+              <a:t>e.message</a:t>
+            </a:r>
+            <a:r>
+              <a:rPr lang="fr-FR" sz="1200" dirty="0">
+                <a:latin typeface="Courier New" panose="02070309020205020404" pitchFamily="49" charset="0"/>
+                <a:cs typeface="Courier New" panose="02070309020205020404" pitchFamily="49" charset="0"/>
+              </a:rPr>
+              <a:t>)</a:t>
+            </a:r>
+          </a:p>
+          <a:p>
+            <a:r>
+              <a:rPr lang="fr-FR" sz="1200" dirty="0">
+                <a:latin typeface="Courier New" panose="02070309020205020404" pitchFamily="49" charset="0"/>
+                <a:cs typeface="Courier New" panose="02070309020205020404" pitchFamily="49" charset="0"/>
+              </a:rPr>
+              <a:t>        </a:t>
+            </a:r>
+            <a:r>
+              <a:rPr lang="fr-FR" sz="1200" dirty="0" err="1">
+                <a:latin typeface="Courier New" panose="02070309020205020404" pitchFamily="49" charset="0"/>
+                <a:cs typeface="Courier New" panose="02070309020205020404" pitchFamily="49" charset="0"/>
+              </a:rPr>
+              <a:t>sys.exit</a:t>
+            </a:r>
+            <a:r>
+              <a:rPr lang="fr-FR" sz="1200" dirty="0">
+                <a:latin typeface="Courier New" panose="02070309020205020404" pitchFamily="49" charset="0"/>
+                <a:cs typeface="Courier New" panose="02070309020205020404" pitchFamily="49" charset="0"/>
+              </a:rPr>
+              <a:t>()</a:t>
+            </a:r>
+          </a:p>
+          <a:p>
+            <a:endParaRPr lang="fr-FR" sz="1200" dirty="0">
+              <a:latin typeface="Courier New" panose="02070309020205020404" pitchFamily="49" charset="0"/>
+              <a:cs typeface="Courier New" panose="02070309020205020404" pitchFamily="49" charset="0"/>
+            </a:endParaRPr>
+          </a:p>
+          <a:p>
+            <a:r>
+              <a:rPr lang="fr-FR" sz="1200" dirty="0" err="1">
+                <a:latin typeface="Courier New" panose="02070309020205020404" pitchFamily="49" charset="0"/>
+                <a:cs typeface="Courier New" panose="02070309020205020404" pitchFamily="49" charset="0"/>
+              </a:rPr>
+              <a:t>stars.create_index</a:t>
+            </a:r>
+            <a:r>
+              <a:rPr lang="fr-FR" sz="1200" dirty="0">
+                <a:latin typeface="Courier New" panose="02070309020205020404" pitchFamily="49" charset="0"/>
+                <a:cs typeface="Courier New" panose="02070309020205020404" pitchFamily="49" charset="0"/>
+              </a:rPr>
+              <a:t>([('center', '2dsphere')])</a:t>
+            </a:r>
+            <a:endParaRPr lang="fr-FR" sz="1200" dirty="0" smtClean="0">
+              <a:latin typeface="Courier New" panose="02070309020205020404" pitchFamily="49" charset="0"/>
+              <a:cs typeface="Courier New" panose="02070309020205020404" pitchFamily="49" charset="0"/>
+            </a:endParaRPr>
+          </a:p>
+        </p:txBody>
+      </p:sp>
+      <p:sp>
+        <p:nvSpPr>
+          <p:cNvPr id="5" name="ZoneTexte 4"/>
+          <p:cNvSpPr txBox="1"/>
+          <p:nvPr/>
+        </p:nvSpPr>
+        <p:spPr>
+          <a:xfrm>
+            <a:off x="611560" y="4748951"/>
+            <a:ext cx="7901522" cy="1200329"/>
+          </a:xfrm>
+          <a:prstGeom prst="rect">
+            <a:avLst/>
+          </a:prstGeom>
+          <a:solidFill>
+            <a:schemeClr val="bg1">
+              <a:lumMod val="95000"/>
+            </a:schemeClr>
+          </a:solidFill>
+          <a:ln>
+            <a:solidFill>
+              <a:srgbClr val="0070C0"/>
+            </a:solidFill>
+          </a:ln>
+        </p:spPr>
+        <p:txBody>
+          <a:bodyPr wrap="none" rtlCol="0">
+            <a:spAutoFit/>
+          </a:bodyPr>
+          <a:lstStyle/>
+          <a:p>
+            <a:endParaRPr lang="fr-FR" sz="1200" dirty="0">
+              <a:latin typeface="Courier New" panose="02070309020205020404" pitchFamily="49" charset="0"/>
+              <a:cs typeface="Courier New" panose="02070309020205020404" pitchFamily="49" charset="0"/>
+            </a:endParaRPr>
+          </a:p>
+          <a:p>
+            <a:r>
+              <a:rPr lang="fr-FR" sz="1200" dirty="0">
+                <a:latin typeface="Courier New" panose="02070309020205020404" pitchFamily="49" charset="0"/>
+                <a:cs typeface="Courier New" panose="02070309020205020404" pitchFamily="49" charset="0"/>
+              </a:rPr>
+              <a:t>c</a:t>
+            </a:r>
+            <a:r>
+              <a:rPr lang="fr-FR" sz="1200" dirty="0" smtClean="0">
+                <a:latin typeface="Courier New" panose="02070309020205020404" pitchFamily="49" charset="0"/>
+                <a:cs typeface="Courier New" panose="02070309020205020404" pitchFamily="49" charset="0"/>
+              </a:rPr>
+              <a:t>enter = </a:t>
+            </a:r>
+            <a:r>
+              <a:rPr lang="fr-FR" sz="1200" dirty="0">
+                <a:latin typeface="Courier New" panose="02070309020205020404" pitchFamily="49" charset="0"/>
+                <a:cs typeface="Courier New" panose="02070309020205020404" pitchFamily="49" charset="0"/>
+              </a:rPr>
+              <a:t>[[</a:t>
+            </a:r>
+            <a:r>
+              <a:rPr lang="fr-FR" sz="1200" dirty="0" err="1">
+                <a:latin typeface="Courier New" panose="02070309020205020404" pitchFamily="49" charset="0"/>
+                <a:cs typeface="Courier New" panose="02070309020205020404" pitchFamily="49" charset="0"/>
+              </a:rPr>
+              <a:t>cluster.ra</a:t>
+            </a:r>
+            <a:r>
+              <a:rPr lang="fr-FR" sz="1200" dirty="0">
+                <a:latin typeface="Courier New" panose="02070309020205020404" pitchFamily="49" charset="0"/>
+                <a:cs typeface="Courier New" panose="02070309020205020404" pitchFamily="49" charset="0"/>
+              </a:rPr>
+              <a:t>(), </a:t>
+            </a:r>
+            <a:r>
+              <a:rPr lang="fr-FR" sz="1200" dirty="0" err="1">
+                <a:latin typeface="Courier New" panose="02070309020205020404" pitchFamily="49" charset="0"/>
+                <a:cs typeface="Courier New" panose="02070309020205020404" pitchFamily="49" charset="0"/>
+              </a:rPr>
+              <a:t>cluster.dec</a:t>
+            </a:r>
+            <a:r>
+              <a:rPr lang="fr-FR" sz="1200" dirty="0">
+                <a:latin typeface="Courier New" panose="02070309020205020404" pitchFamily="49" charset="0"/>
+                <a:cs typeface="Courier New" panose="02070309020205020404" pitchFamily="49" charset="0"/>
+              </a:rPr>
+              <a:t>()]</a:t>
+            </a:r>
+            <a:endParaRPr lang="fr-FR" sz="1200" dirty="0" smtClean="0">
+              <a:latin typeface="Courier New" panose="02070309020205020404" pitchFamily="49" charset="0"/>
+              <a:cs typeface="Courier New" panose="02070309020205020404" pitchFamily="49" charset="0"/>
+            </a:endParaRPr>
+          </a:p>
+          <a:p>
+            <a:endParaRPr lang="fr-FR" sz="1200" dirty="0">
+              <a:latin typeface="Courier New" panose="02070309020205020404" pitchFamily="49" charset="0"/>
+              <a:cs typeface="Courier New" panose="02070309020205020404" pitchFamily="49" charset="0"/>
+            </a:endParaRPr>
+          </a:p>
+          <a:p>
+            <a:r>
+              <a:rPr lang="fr-FR" sz="1200" dirty="0" smtClean="0">
+                <a:latin typeface="Courier New" panose="02070309020205020404" pitchFamily="49" charset="0"/>
+                <a:cs typeface="Courier New" panose="02070309020205020404" pitchFamily="49" charset="0"/>
+              </a:rPr>
+              <a:t>for o </a:t>
+            </a:r>
+            <a:r>
+              <a:rPr lang="fr-FR" sz="1200" dirty="0">
+                <a:latin typeface="Courier New" panose="02070309020205020404" pitchFamily="49" charset="0"/>
+                <a:cs typeface="Courier New" panose="02070309020205020404" pitchFamily="49" charset="0"/>
+              </a:rPr>
+              <a:t>in </a:t>
+            </a:r>
+            <a:r>
+              <a:rPr lang="fr-FR" sz="1200" b="1" dirty="0" err="1" smtClean="0">
+                <a:latin typeface="Courier New" panose="02070309020205020404" pitchFamily="49" charset="0"/>
+                <a:cs typeface="Courier New" panose="02070309020205020404" pitchFamily="49" charset="0"/>
+              </a:rPr>
+              <a:t>stars.find</a:t>
+            </a:r>
+            <a:r>
+              <a:rPr lang="fr-FR" sz="1200" dirty="0">
+                <a:latin typeface="Courier New" panose="02070309020205020404" pitchFamily="49" charset="0"/>
+                <a:cs typeface="Courier New" panose="02070309020205020404" pitchFamily="49" charset="0"/>
+              </a:rPr>
+              <a:t>({'center': {'$</a:t>
+            </a:r>
+            <a:r>
+              <a:rPr lang="fr-FR" sz="1200" dirty="0" err="1">
+                <a:latin typeface="Courier New" panose="02070309020205020404" pitchFamily="49" charset="0"/>
+                <a:cs typeface="Courier New" panose="02070309020205020404" pitchFamily="49" charset="0"/>
+              </a:rPr>
+              <a:t>geoWithin</a:t>
+            </a:r>
+            <a:r>
+              <a:rPr lang="fr-FR" sz="1200" dirty="0">
+                <a:latin typeface="Courier New" panose="02070309020205020404" pitchFamily="49" charset="0"/>
+                <a:cs typeface="Courier New" panose="02070309020205020404" pitchFamily="49" charset="0"/>
+              </a:rPr>
+              <a:t>': {'$</a:t>
+            </a:r>
+            <a:r>
+              <a:rPr lang="fr-FR" sz="1200" dirty="0" err="1">
+                <a:latin typeface="Courier New" panose="02070309020205020404" pitchFamily="49" charset="0"/>
+                <a:cs typeface="Courier New" panose="02070309020205020404" pitchFamily="49" charset="0"/>
+              </a:rPr>
+              <a:t>centerSphere</a:t>
+            </a:r>
+            <a:r>
+              <a:rPr lang="fr-FR" sz="1200" dirty="0" smtClean="0">
+                <a:latin typeface="Courier New" panose="02070309020205020404" pitchFamily="49" charset="0"/>
+                <a:cs typeface="Courier New" panose="02070309020205020404" pitchFamily="49" charset="0"/>
+              </a:rPr>
+              <a:t>': center, </a:t>
+            </a:r>
+            <a:r>
+              <a:rPr lang="fr-FR" sz="1200" dirty="0">
+                <a:latin typeface="Courier New" panose="02070309020205020404" pitchFamily="49" charset="0"/>
+                <a:cs typeface="Courier New" panose="02070309020205020404" pitchFamily="49" charset="0"/>
+              </a:rPr>
+              <a:t>radius]}}},</a:t>
+            </a:r>
+          </a:p>
+          <a:p>
+            <a:r>
+              <a:rPr lang="fr-FR" sz="1200" dirty="0">
+                <a:latin typeface="Courier New" panose="02070309020205020404" pitchFamily="49" charset="0"/>
+                <a:cs typeface="Courier New" panose="02070309020205020404" pitchFamily="49" charset="0"/>
+              </a:rPr>
+              <a:t>                    {'_id': 0, '</a:t>
+            </a:r>
+            <a:r>
+              <a:rPr lang="fr-FR" sz="1200" dirty="0" err="1">
+                <a:latin typeface="Courier New" panose="02070309020205020404" pitchFamily="49" charset="0"/>
+                <a:cs typeface="Courier New" panose="02070309020205020404" pitchFamily="49" charset="0"/>
+              </a:rPr>
+              <a:t>where</a:t>
+            </a:r>
+            <a:r>
+              <a:rPr lang="fr-FR" sz="1200" dirty="0">
+                <a:latin typeface="Courier New" panose="02070309020205020404" pitchFamily="49" charset="0"/>
+                <a:cs typeface="Courier New" panose="02070309020205020404" pitchFamily="49" charset="0"/>
+              </a:rPr>
+              <a:t>': 1, 'center': 1</a:t>
+            </a:r>
+            <a:r>
+              <a:rPr lang="fr-FR" sz="1200" dirty="0" smtClean="0">
+                <a:latin typeface="Courier New" panose="02070309020205020404" pitchFamily="49" charset="0"/>
+                <a:cs typeface="Courier New" panose="02070309020205020404" pitchFamily="49" charset="0"/>
+              </a:rPr>
+              <a:t>}):</a:t>
+            </a:r>
+            <a:endParaRPr lang="fr-FR" sz="1200" dirty="0">
+              <a:latin typeface="Courier New" panose="02070309020205020404" pitchFamily="49" charset="0"/>
+              <a:cs typeface="Courier New" panose="02070309020205020404" pitchFamily="49" charset="0"/>
+            </a:endParaRPr>
+          </a:p>
+          <a:p>
+            <a:r>
+              <a:rPr lang="fr-FR" sz="1200" dirty="0">
+                <a:latin typeface="Courier New" panose="02070309020205020404" pitchFamily="49" charset="0"/>
+                <a:cs typeface="Courier New" panose="02070309020205020404" pitchFamily="49" charset="0"/>
+              </a:rPr>
+              <a:t>    </a:t>
+            </a:r>
+            <a:r>
+              <a:rPr lang="fr-FR" sz="1200" dirty="0" err="1">
+                <a:latin typeface="Courier New" panose="02070309020205020404" pitchFamily="49" charset="0"/>
+                <a:cs typeface="Courier New" panose="02070309020205020404" pitchFamily="49" charset="0"/>
+              </a:rPr>
+              <a:t>print</a:t>
+            </a:r>
+            <a:r>
+              <a:rPr lang="fr-FR" sz="1200" dirty="0">
+                <a:latin typeface="Courier New" panose="02070309020205020404" pitchFamily="49" charset="0"/>
+                <a:cs typeface="Courier New" panose="02070309020205020404" pitchFamily="49" charset="0"/>
+              </a:rPr>
+              <a:t>('</a:t>
+            </a:r>
+            <a:r>
+              <a:rPr lang="fr-FR" sz="1200" dirty="0" err="1">
+                <a:latin typeface="Courier New" panose="02070309020205020404" pitchFamily="49" charset="0"/>
+                <a:cs typeface="Courier New" panose="02070309020205020404" pitchFamily="49" charset="0"/>
+              </a:rPr>
+              <a:t>identified</a:t>
+            </a:r>
+            <a:r>
+              <a:rPr lang="fr-FR" sz="1200" dirty="0">
+                <a:latin typeface="Courier New" panose="02070309020205020404" pitchFamily="49" charset="0"/>
+                <a:cs typeface="Courier New" panose="02070309020205020404" pitchFamily="49" charset="0"/>
+              </a:rPr>
+              <a:t> </a:t>
+            </a:r>
+            <a:r>
+              <a:rPr lang="fr-FR" sz="1200" dirty="0" err="1">
+                <a:latin typeface="Courier New" panose="02070309020205020404" pitchFamily="49" charset="0"/>
+                <a:cs typeface="Courier New" panose="02070309020205020404" pitchFamily="49" charset="0"/>
+              </a:rPr>
+              <a:t>object</a:t>
+            </a:r>
+            <a:r>
+              <a:rPr lang="fr-FR" sz="1200" dirty="0">
+                <a:latin typeface="Courier New" panose="02070309020205020404" pitchFamily="49" charset="0"/>
+                <a:cs typeface="Courier New" panose="02070309020205020404" pitchFamily="49" charset="0"/>
+              </a:rPr>
+              <a:t>')</a:t>
+            </a:r>
+            <a:endParaRPr lang="fr-FR" sz="1200" dirty="0" smtClean="0">
+              <a:latin typeface="Courier New" panose="02070309020205020404" pitchFamily="49" charset="0"/>
+              <a:cs typeface="Courier New" panose="02070309020205020404" pitchFamily="49" charset="0"/>
+            </a:endParaRPr>
+          </a:p>
+        </p:txBody>
+      </p:sp>
+    </p:spTree>
+    <p:extLst>
+      <p:ext uri="{BB962C8B-B14F-4D97-AF65-F5344CB8AC3E}">
+        <p14:creationId xmlns:p14="http://schemas.microsoft.com/office/powerpoint/2010/main" val="2497904357"/>
+      </p:ext>
+    </p:extLst>
+  </p:cSld>
+  <p:clrMapOvr>
+    <a:masterClrMapping/>
+  </p:clrMapOvr>
+  <p:timing>
+    <p:tnLst>
+      <p:par>
+        <p:cTn id="1" dur="indefinite" restart="never" nodeType="tmRoot"/>
+      </p:par>
+    </p:tnLst>
+  </p:timing>
 </p:sld>
 </file>
 
@@ -4485,6 +7049,13 @@
   <p:clrMapOvr>
     <a:masterClrMapping/>
   </p:clrMapOvr>
+  <p:timing>
+    <p:tnLst>
+      <p:par>
+        <p:cTn id="1" dur="indefinite" restart="never" nodeType="tmRoot"/>
+      </p:par>
+    </p:tnLst>
+  </p:timing>
 </p:sld>
 </file>
 
@@ -4628,6 +7199,13 @@
   <p:clrMapOvr>
     <a:masterClrMapping/>
   </p:clrMapOvr>
+  <p:timing>
+    <p:tnLst>
+      <p:par>
+        <p:cTn id="1" dur="indefinite" restart="never" nodeType="tmRoot"/>
+      </p:par>
+    </p:tnLst>
+  </p:timing>
 </p:sld>
 </file>
 
@@ -4822,6 +7400,13 @@
   <p:clrMapOvr>
     <a:masterClrMapping/>
   </p:clrMapOvr>
+  <p:timing>
+    <p:tnLst>
+      <p:par>
+        <p:cTn id="1" dur="indefinite" restart="never" nodeType="tmRoot"/>
+      </p:par>
+    </p:tnLst>
+  </p:timing>
 </p:sld>
 </file>
 
@@ -4918,6 +7503,13 @@
   <p:clrMapOvr>
     <a:masterClrMapping/>
   </p:clrMapOvr>
+  <p:timing>
+    <p:tnLst>
+      <p:par>
+        <p:cTn id="1" dur="indefinite" restart="never" nodeType="tmRoot"/>
+      </p:par>
+    </p:tnLst>
+  </p:timing>
 </p:sld>
 </file>
 
@@ -5065,6 +7657,647 @@
   <p:clrMapOvr>
     <a:masterClrMapping/>
   </p:clrMapOvr>
+  <p:timing>
+    <p:tnLst>
+      <p:par>
+        <p:cTn id="1" dur="indefinite" restart="never" nodeType="tmRoot"/>
+      </p:par>
+    </p:tnLst>
+  </p:timing>
+</p:sld>
+</file>
+
+<file path=ppt/slides/slide7.xml><?xml version="1.0" encoding="utf-8"?>
+<p:sld xmlns:a="http://schemas.openxmlformats.org/drawingml/2006/main" xmlns:r="http://schemas.openxmlformats.org/officeDocument/2006/relationships" xmlns:p="http://schemas.openxmlformats.org/presentationml/2006/main">
+  <p:cSld>
+    <p:spTree>
+      <p:nvGrpSpPr>
+        <p:cNvPr id="1" name=""/>
+        <p:cNvGrpSpPr/>
+        <p:nvPr/>
+      </p:nvGrpSpPr>
+      <p:grpSpPr>
+        <a:xfrm>
+          <a:off x="0" y="0"/>
+          <a:ext cx="0" cy="0"/>
+          <a:chOff x="0" y="0"/>
+          <a:chExt cx="0" cy="0"/>
+        </a:xfrm>
+      </p:grpSpPr>
+      <p:sp>
+        <p:nvSpPr>
+          <p:cNvPr id="8" name="Espace réservé du contenu 2"/>
+          <p:cNvSpPr>
+            <a:spLocks noGrp="1"/>
+          </p:cNvSpPr>
+          <p:nvPr>
+            <p:ph idx="1"/>
+          </p:nvPr>
+        </p:nvSpPr>
+        <p:spPr>
+          <a:xfrm>
+            <a:off x="457200" y="980728"/>
+            <a:ext cx="8229600" cy="5145435"/>
+          </a:xfrm>
+        </p:spPr>
+        <p:txBody>
+          <a:bodyPr/>
+          <a:lstStyle/>
+          <a:p>
+            <a:r>
+              <a:rPr lang="fr-FR" dirty="0" smtClean="0"/>
+              <a:t>Python seul</a:t>
+            </a:r>
+          </a:p>
+          <a:p>
+            <a:endParaRPr lang="fr-FR" dirty="0"/>
+          </a:p>
+          <a:p>
+            <a:endParaRPr lang="fr-FR" dirty="0" smtClean="0"/>
+          </a:p>
+          <a:p>
+            <a:endParaRPr lang="fr-FR" dirty="0"/>
+          </a:p>
+          <a:p>
+            <a:endParaRPr lang="fr-FR" dirty="0" smtClean="0"/>
+          </a:p>
+          <a:p>
+            <a:r>
+              <a:rPr lang="fr-FR" dirty="0" smtClean="0"/>
+              <a:t>Avec </a:t>
+            </a:r>
+            <a:r>
+              <a:rPr lang="fr-FR" dirty="0" err="1" smtClean="0"/>
+              <a:t>Spark</a:t>
+            </a:r>
+            <a:endParaRPr lang="fr-FR" dirty="0" smtClean="0"/>
+          </a:p>
+        </p:txBody>
+      </p:sp>
+      <p:sp>
+        <p:nvSpPr>
+          <p:cNvPr id="2" name="Titre 1"/>
+          <p:cNvSpPr>
+            <a:spLocks noGrp="1"/>
+          </p:cNvSpPr>
+          <p:nvPr>
+            <p:ph type="title"/>
+          </p:nvPr>
+        </p:nvSpPr>
+        <p:spPr/>
+        <p:txBody>
+          <a:bodyPr>
+            <a:normAutofit fontScale="90000"/>
+          </a:bodyPr>
+          <a:lstStyle/>
+          <a:p>
+            <a:r>
+              <a:rPr lang="fr-FR" dirty="0" smtClean="0"/>
+              <a:t>Valeurs utilisées</a:t>
+            </a:r>
+            <a:endParaRPr lang="fr-FR" dirty="0"/>
+          </a:p>
+        </p:txBody>
+      </p:sp>
+      <p:sp>
+        <p:nvSpPr>
+          <p:cNvPr id="5" name="ZoneTexte 4"/>
+          <p:cNvSpPr txBox="1"/>
+          <p:nvPr/>
+        </p:nvSpPr>
+        <p:spPr>
+          <a:xfrm>
+            <a:off x="539552" y="1685707"/>
+            <a:ext cx="3493264" cy="2031325"/>
+          </a:xfrm>
+          <a:prstGeom prst="rect">
+            <a:avLst/>
+          </a:prstGeom>
+          <a:solidFill>
+            <a:schemeClr val="bg1">
+              <a:lumMod val="95000"/>
+            </a:schemeClr>
+          </a:solidFill>
+          <a:ln>
+            <a:solidFill>
+              <a:srgbClr val="0070C0"/>
+            </a:solidFill>
+          </a:ln>
+        </p:spPr>
+        <p:txBody>
+          <a:bodyPr wrap="none" rtlCol="0">
+            <a:spAutoFit/>
+          </a:bodyPr>
+          <a:lstStyle/>
+          <a:p>
+            <a:r>
+              <a:rPr lang="fr-FR" dirty="0" smtClean="0">
+                <a:latin typeface="Courier New" panose="02070309020205020404" pitchFamily="49" charset="0"/>
+                <a:cs typeface="Courier New" panose="02070309020205020404" pitchFamily="49" charset="0"/>
+              </a:rPr>
+              <a:t>RAPATCHES </a:t>
+            </a:r>
+            <a:r>
+              <a:rPr lang="fr-FR" dirty="0">
+                <a:latin typeface="Courier New" panose="02070309020205020404" pitchFamily="49" charset="0"/>
+                <a:cs typeface="Courier New" panose="02070309020205020404" pitchFamily="49" charset="0"/>
+              </a:rPr>
+              <a:t>= 800</a:t>
+            </a:r>
+            <a:br>
+              <a:rPr lang="fr-FR" dirty="0">
+                <a:latin typeface="Courier New" panose="02070309020205020404" pitchFamily="49" charset="0"/>
+                <a:cs typeface="Courier New" panose="02070309020205020404" pitchFamily="49" charset="0"/>
+              </a:rPr>
+            </a:br>
+            <a:r>
+              <a:rPr lang="fr-FR" dirty="0">
+                <a:latin typeface="Courier New" panose="02070309020205020404" pitchFamily="49" charset="0"/>
+                <a:cs typeface="Courier New" panose="02070309020205020404" pitchFamily="49" charset="0"/>
+              </a:rPr>
+              <a:t>DECPATCHES = </a:t>
+            </a:r>
+            <a:r>
+              <a:rPr lang="fr-FR" dirty="0" smtClean="0">
+                <a:latin typeface="Courier New" panose="02070309020205020404" pitchFamily="49" charset="0"/>
+                <a:cs typeface="Courier New" panose="02070309020205020404" pitchFamily="49" charset="0"/>
+              </a:rPr>
+              <a:t>400</a:t>
+            </a:r>
+            <a:r>
+              <a:rPr lang="fr-FR" dirty="0">
+                <a:latin typeface="Courier New" panose="02070309020205020404" pitchFamily="49" charset="0"/>
+                <a:cs typeface="Courier New" panose="02070309020205020404" pitchFamily="49" charset="0"/>
+              </a:rPr>
+              <a:t/>
+            </a:r>
+            <a:br>
+              <a:rPr lang="fr-FR" dirty="0">
+                <a:latin typeface="Courier New" panose="02070309020205020404" pitchFamily="49" charset="0"/>
+                <a:cs typeface="Courier New" panose="02070309020205020404" pitchFamily="49" charset="0"/>
+              </a:rPr>
+            </a:br>
+            <a:r>
+              <a:rPr lang="fr-FR" dirty="0">
+                <a:latin typeface="Courier New" panose="02070309020205020404" pitchFamily="49" charset="0"/>
+                <a:cs typeface="Courier New" panose="02070309020205020404" pitchFamily="49" charset="0"/>
+              </a:rPr>
+              <a:t>PIXELS_PER_DEGREE = </a:t>
+            </a:r>
+            <a:r>
+              <a:rPr lang="fr-FR" dirty="0" smtClean="0">
+                <a:latin typeface="Courier New" panose="02070309020205020404" pitchFamily="49" charset="0"/>
+                <a:cs typeface="Courier New" panose="02070309020205020404" pitchFamily="49" charset="0"/>
+              </a:rPr>
+              <a:t>8000</a:t>
+            </a:r>
+            <a:r>
+              <a:rPr lang="fr-FR" dirty="0">
+                <a:latin typeface="Courier New" panose="02070309020205020404" pitchFamily="49" charset="0"/>
+                <a:cs typeface="Courier New" panose="02070309020205020404" pitchFamily="49" charset="0"/>
+              </a:rPr>
+              <a:t/>
+            </a:r>
+            <a:br>
+              <a:rPr lang="fr-FR" dirty="0">
+                <a:latin typeface="Courier New" panose="02070309020205020404" pitchFamily="49" charset="0"/>
+                <a:cs typeface="Courier New" panose="02070309020205020404" pitchFamily="49" charset="0"/>
+              </a:rPr>
+            </a:br>
+            <a:r>
+              <a:rPr lang="fr-FR" dirty="0">
+                <a:latin typeface="Courier New" panose="02070309020205020404" pitchFamily="49" charset="0"/>
+                <a:cs typeface="Courier New" panose="02070309020205020404" pitchFamily="49" charset="0"/>
+              </a:rPr>
+              <a:t>RA0 = -20.0</a:t>
+            </a:r>
+            <a:br>
+              <a:rPr lang="fr-FR" dirty="0">
+                <a:latin typeface="Courier New" panose="02070309020205020404" pitchFamily="49" charset="0"/>
+                <a:cs typeface="Courier New" panose="02070309020205020404" pitchFamily="49" charset="0"/>
+              </a:rPr>
+            </a:br>
+            <a:r>
+              <a:rPr lang="fr-FR" dirty="0">
+                <a:latin typeface="Courier New" panose="02070309020205020404" pitchFamily="49" charset="0"/>
+                <a:cs typeface="Courier New" panose="02070309020205020404" pitchFamily="49" charset="0"/>
+              </a:rPr>
+              <a:t>DEC0 = 20</a:t>
+            </a:r>
+            <a:br>
+              <a:rPr lang="fr-FR" dirty="0">
+                <a:latin typeface="Courier New" panose="02070309020205020404" pitchFamily="49" charset="0"/>
+                <a:cs typeface="Courier New" panose="02070309020205020404" pitchFamily="49" charset="0"/>
+              </a:rPr>
+            </a:br>
+            <a:r>
+              <a:rPr lang="fr-FR" dirty="0">
+                <a:latin typeface="Courier New" panose="02070309020205020404" pitchFamily="49" charset="0"/>
+                <a:cs typeface="Courier New" panose="02070309020205020404" pitchFamily="49" charset="0"/>
+              </a:rPr>
+              <a:t>IMAGES_IN_RA = 3</a:t>
+            </a:r>
+            <a:br>
+              <a:rPr lang="fr-FR" dirty="0">
+                <a:latin typeface="Courier New" panose="02070309020205020404" pitchFamily="49" charset="0"/>
+                <a:cs typeface="Courier New" panose="02070309020205020404" pitchFamily="49" charset="0"/>
+              </a:rPr>
+            </a:br>
+            <a:r>
+              <a:rPr lang="fr-FR" dirty="0">
+                <a:latin typeface="Courier New" panose="02070309020205020404" pitchFamily="49" charset="0"/>
+                <a:cs typeface="Courier New" panose="02070309020205020404" pitchFamily="49" charset="0"/>
+              </a:rPr>
+              <a:t>IMAGES_IN_DEC = 2</a:t>
+            </a:r>
+            <a:endParaRPr lang="fr-FR" dirty="0" smtClean="0">
+              <a:latin typeface="Courier New" panose="02070309020205020404" pitchFamily="49" charset="0"/>
+              <a:cs typeface="Courier New" panose="02070309020205020404" pitchFamily="49" charset="0"/>
+            </a:endParaRPr>
+          </a:p>
+        </p:txBody>
+      </p:sp>
+      <p:sp>
+        <p:nvSpPr>
+          <p:cNvPr id="6" name="ZoneTexte 5"/>
+          <p:cNvSpPr txBox="1"/>
+          <p:nvPr/>
+        </p:nvSpPr>
+        <p:spPr>
+          <a:xfrm>
+            <a:off x="5580112" y="2062589"/>
+            <a:ext cx="2666114" cy="646331"/>
+          </a:xfrm>
+          <a:prstGeom prst="rect">
+            <a:avLst/>
+          </a:prstGeom>
+          <a:solidFill>
+            <a:schemeClr val="bg1">
+              <a:lumMod val="95000"/>
+            </a:schemeClr>
+          </a:solidFill>
+          <a:ln>
+            <a:solidFill>
+              <a:srgbClr val="0070C0"/>
+            </a:solidFill>
+          </a:ln>
+        </p:spPr>
+        <p:txBody>
+          <a:bodyPr wrap="none" rtlCol="0">
+            <a:spAutoFit/>
+          </a:bodyPr>
+          <a:lstStyle/>
+          <a:p>
+            <a:r>
+              <a:rPr lang="fr-FR" dirty="0" smtClean="0">
+                <a:latin typeface="Courier New" panose="02070309020205020404" pitchFamily="49" charset="0"/>
+                <a:cs typeface="Courier New" panose="02070309020205020404" pitchFamily="49" charset="0"/>
+              </a:rPr>
+              <a:t>13’5</a:t>
+            </a:r>
+          </a:p>
+          <a:p>
+            <a:r>
+              <a:rPr lang="fr-FR" dirty="0" smtClean="0">
+                <a:latin typeface="Courier New" panose="02070309020205020404" pitchFamily="49" charset="0"/>
+                <a:cs typeface="Courier New" panose="02070309020205020404" pitchFamily="49" charset="0"/>
+              </a:rPr>
+              <a:t>1800 x 1800 pixels</a:t>
+            </a:r>
+            <a:endParaRPr lang="fr-FR" dirty="0">
+              <a:latin typeface="Courier New" panose="02070309020205020404" pitchFamily="49" charset="0"/>
+              <a:cs typeface="Courier New" panose="02070309020205020404" pitchFamily="49" charset="0"/>
+            </a:endParaRPr>
+          </a:p>
+        </p:txBody>
+      </p:sp>
+      <p:sp>
+        <p:nvSpPr>
+          <p:cNvPr id="7" name="Flèche droite 6"/>
+          <p:cNvSpPr/>
+          <p:nvPr/>
+        </p:nvSpPr>
+        <p:spPr>
+          <a:xfrm>
+            <a:off x="4211960" y="2132856"/>
+            <a:ext cx="1152128" cy="504056"/>
+          </a:xfrm>
+          <a:prstGeom prst="rightArrow">
+            <a:avLst/>
+          </a:prstGeom>
+        </p:spPr>
+        <p:style>
+          <a:lnRef idx="2">
+            <a:schemeClr val="accent1">
+              <a:shade val="50000"/>
+            </a:schemeClr>
+          </a:lnRef>
+          <a:fillRef idx="1">
+            <a:schemeClr val="accent1"/>
+          </a:fillRef>
+          <a:effectRef idx="0">
+            <a:schemeClr val="accent1"/>
+          </a:effectRef>
+          <a:fontRef idx="minor">
+            <a:schemeClr val="lt1"/>
+          </a:fontRef>
+        </p:style>
+        <p:txBody>
+          <a:bodyPr rtlCol="0" anchor="ctr"/>
+          <a:lstStyle/>
+          <a:p>
+            <a:pPr algn="ctr"/>
+            <a:r>
+              <a:rPr lang="fr-FR" dirty="0" smtClean="0"/>
+              <a:t>1 image</a:t>
+            </a:r>
+            <a:endParaRPr lang="fr-FR" dirty="0"/>
+          </a:p>
+        </p:txBody>
+      </p:sp>
+      <p:sp>
+        <p:nvSpPr>
+          <p:cNvPr id="9" name="ZoneTexte 8"/>
+          <p:cNvSpPr txBox="1"/>
+          <p:nvPr/>
+        </p:nvSpPr>
+        <p:spPr>
+          <a:xfrm>
+            <a:off x="539552" y="4494019"/>
+            <a:ext cx="2666114" cy="923330"/>
+          </a:xfrm>
+          <a:prstGeom prst="rect">
+            <a:avLst/>
+          </a:prstGeom>
+          <a:solidFill>
+            <a:schemeClr val="bg1">
+              <a:lumMod val="95000"/>
+            </a:schemeClr>
+          </a:solidFill>
+          <a:ln>
+            <a:solidFill>
+              <a:srgbClr val="0070C0"/>
+            </a:solidFill>
+          </a:ln>
+        </p:spPr>
+        <p:txBody>
+          <a:bodyPr wrap="none" rtlCol="0">
+            <a:spAutoFit/>
+          </a:bodyPr>
+          <a:lstStyle/>
+          <a:p>
+            <a:r>
+              <a:rPr lang="fr-FR" dirty="0" smtClean="0">
+                <a:latin typeface="Courier New" panose="02070309020205020404" pitchFamily="49" charset="0"/>
+                <a:cs typeface="Courier New" panose="02070309020205020404" pitchFamily="49" charset="0"/>
+              </a:rPr>
+              <a:t>IMAGES_IN_RA </a:t>
+            </a:r>
+            <a:r>
+              <a:rPr lang="fr-FR" dirty="0">
+                <a:latin typeface="Courier New" panose="02070309020205020404" pitchFamily="49" charset="0"/>
+                <a:cs typeface="Courier New" panose="02070309020205020404" pitchFamily="49" charset="0"/>
+              </a:rPr>
+              <a:t>= </a:t>
+            </a:r>
+            <a:r>
+              <a:rPr lang="fr-FR" dirty="0" smtClean="0">
+                <a:latin typeface="Courier New" panose="02070309020205020404" pitchFamily="49" charset="0"/>
+                <a:cs typeface="Courier New" panose="02070309020205020404" pitchFamily="49" charset="0"/>
+              </a:rPr>
+              <a:t>5</a:t>
+            </a:r>
+            <a:r>
+              <a:rPr lang="fr-FR" dirty="0">
+                <a:latin typeface="Courier New" panose="02070309020205020404" pitchFamily="49" charset="0"/>
+                <a:cs typeface="Courier New" panose="02070309020205020404" pitchFamily="49" charset="0"/>
+              </a:rPr>
+              <a:t/>
+            </a:r>
+            <a:br>
+              <a:rPr lang="fr-FR" dirty="0">
+                <a:latin typeface="Courier New" panose="02070309020205020404" pitchFamily="49" charset="0"/>
+                <a:cs typeface="Courier New" panose="02070309020205020404" pitchFamily="49" charset="0"/>
+              </a:rPr>
+            </a:br>
+            <a:r>
+              <a:rPr lang="fr-FR" dirty="0">
+                <a:latin typeface="Courier New" panose="02070309020205020404" pitchFamily="49" charset="0"/>
+                <a:cs typeface="Courier New" panose="02070309020205020404" pitchFamily="49" charset="0"/>
+              </a:rPr>
+              <a:t>IMAGES_IN_DEC = </a:t>
+            </a:r>
+            <a:r>
+              <a:rPr lang="fr-FR" dirty="0" smtClean="0">
+                <a:latin typeface="Courier New" panose="02070309020205020404" pitchFamily="49" charset="0"/>
+                <a:cs typeface="Courier New" panose="02070309020205020404" pitchFamily="49" charset="0"/>
+              </a:rPr>
+              <a:t>5</a:t>
+            </a:r>
+          </a:p>
+          <a:p>
+            <a:r>
+              <a:rPr lang="fr-FR" dirty="0" smtClean="0">
+                <a:latin typeface="Courier New" panose="02070309020205020404" pitchFamily="49" charset="0"/>
+                <a:cs typeface="Courier New" panose="02070309020205020404" pitchFamily="49" charset="0"/>
+              </a:rPr>
+              <a:t>8000 x 8000 pixels</a:t>
+            </a:r>
+          </a:p>
+        </p:txBody>
+      </p:sp>
+    </p:spTree>
+    <p:extLst>
+      <p:ext uri="{BB962C8B-B14F-4D97-AF65-F5344CB8AC3E}">
+        <p14:creationId xmlns:p14="http://schemas.microsoft.com/office/powerpoint/2010/main" val="346030227"/>
+      </p:ext>
+    </p:extLst>
+  </p:cSld>
+  <p:clrMapOvr>
+    <a:masterClrMapping/>
+  </p:clrMapOvr>
+  <p:timing>
+    <p:tnLst>
+      <p:par>
+        <p:cTn id="1" dur="indefinite" restart="never" nodeType="tmRoot"/>
+      </p:par>
+    </p:tnLst>
+  </p:timing>
+</p:sld>
+</file>
+
+<file path=ppt/slides/slide8.xml><?xml version="1.0" encoding="utf-8"?>
+<p:sld xmlns:a="http://schemas.openxmlformats.org/drawingml/2006/main" xmlns:r="http://schemas.openxmlformats.org/officeDocument/2006/relationships" xmlns:p="http://schemas.openxmlformats.org/presentationml/2006/main">
+  <p:cSld>
+    <p:spTree>
+      <p:nvGrpSpPr>
+        <p:cNvPr id="1" name=""/>
+        <p:cNvGrpSpPr/>
+        <p:nvPr/>
+      </p:nvGrpSpPr>
+      <p:grpSpPr>
+        <a:xfrm>
+          <a:off x="0" y="0"/>
+          <a:ext cx="0" cy="0"/>
+          <a:chOff x="0" y="0"/>
+          <a:chExt cx="0" cy="0"/>
+        </a:xfrm>
+      </p:grpSpPr>
+      <p:pic>
+        <p:nvPicPr>
+          <p:cNvPr id="1026" name="Picture 2"/>
+          <p:cNvPicPr>
+            <a:picLocks noChangeAspect="1" noChangeArrowheads="1"/>
+          </p:cNvPicPr>
+          <p:nvPr/>
+        </p:nvPicPr>
+        <p:blipFill>
+          <a:blip r:embed="rId2">
+            <a:extLst>
+              <a:ext uri="{28A0092B-C50C-407E-A947-70E740481C1C}">
+                <a14:useLocalDpi xmlns:a14="http://schemas.microsoft.com/office/drawing/2010/main" val="0"/>
+              </a:ext>
+            </a:extLst>
+          </a:blip>
+          <a:srcRect/>
+          <a:stretch>
+            <a:fillRect/>
+          </a:stretch>
+        </p:blipFill>
+        <p:spPr bwMode="auto">
+          <a:xfrm>
+            <a:off x="1062038" y="285750"/>
+            <a:ext cx="7019925" cy="6286500"/>
+          </a:xfrm>
+          <a:prstGeom prst="rect">
+            <a:avLst/>
+          </a:prstGeom>
+          <a:noFill/>
+          <a:ln>
+            <a:noFill/>
+          </a:ln>
+          <a:extLst>
+            <a:ext uri="{909E8E84-426E-40DD-AFC4-6F175D3DCCD1}">
+              <a14:hiddenFill xmlns:a14="http://schemas.microsoft.com/office/drawing/2010/main">
+                <a:solidFill>
+                  <a:schemeClr val="accent1"/>
+                </a:solidFill>
+              </a14:hiddenFill>
+            </a:ext>
+            <a:ext uri="{91240B29-F687-4F45-9708-019B960494DF}">
+              <a14:hiddenLine xmlns:a14="http://schemas.microsoft.com/office/drawing/2010/main" w="9525">
+                <a:solidFill>
+                  <a:schemeClr val="tx1"/>
+                </a:solidFill>
+                <a:miter lim="800000"/>
+                <a:headEnd/>
+                <a:tailEnd/>
+              </a14:hiddenLine>
+            </a:ext>
+          </a:extLst>
+        </p:spPr>
+      </p:pic>
+    </p:spTree>
+    <p:extLst>
+      <p:ext uri="{BB962C8B-B14F-4D97-AF65-F5344CB8AC3E}">
+        <p14:creationId xmlns:p14="http://schemas.microsoft.com/office/powerpoint/2010/main" val="2532908120"/>
+      </p:ext>
+    </p:extLst>
+  </p:cSld>
+  <p:clrMapOvr>
+    <a:masterClrMapping/>
+  </p:clrMapOvr>
+</p:sld>
+</file>
+
+<file path=ppt/slides/slide9.xml><?xml version="1.0" encoding="utf-8"?>
+<p:sld xmlns:a="http://schemas.openxmlformats.org/drawingml/2006/main" xmlns:r="http://schemas.openxmlformats.org/officeDocument/2006/relationships" xmlns:p="http://schemas.openxmlformats.org/presentationml/2006/main">
+  <p:cSld>
+    <p:spTree>
+      <p:nvGrpSpPr>
+        <p:cNvPr id="1" name=""/>
+        <p:cNvGrpSpPr/>
+        <p:nvPr/>
+      </p:nvGrpSpPr>
+      <p:grpSpPr>
+        <a:xfrm>
+          <a:off x="0" y="0"/>
+          <a:ext cx="0" cy="0"/>
+          <a:chOff x="0" y="0"/>
+          <a:chExt cx="0" cy="0"/>
+        </a:xfrm>
+      </p:grpSpPr>
+      <p:pic>
+        <p:nvPicPr>
+          <p:cNvPr id="1026" name="Picture 2"/>
+          <p:cNvPicPr>
+            <a:picLocks noChangeAspect="1" noChangeArrowheads="1"/>
+          </p:cNvPicPr>
+          <p:nvPr/>
+        </p:nvPicPr>
+        <p:blipFill>
+          <a:blip r:embed="rId2">
+            <a:extLst>
+              <a:ext uri="{28A0092B-C50C-407E-A947-70E740481C1C}">
+                <a14:useLocalDpi xmlns:a14="http://schemas.microsoft.com/office/drawing/2010/main" val="0"/>
+              </a:ext>
+            </a:extLst>
+          </a:blip>
+          <a:srcRect/>
+          <a:stretch>
+            <a:fillRect/>
+          </a:stretch>
+        </p:blipFill>
+        <p:spPr bwMode="auto">
+          <a:xfrm>
+            <a:off x="809625" y="971550"/>
+            <a:ext cx="7524750" cy="4914900"/>
+          </a:xfrm>
+          <a:prstGeom prst="rect">
+            <a:avLst/>
+          </a:prstGeom>
+          <a:noFill/>
+          <a:ln>
+            <a:noFill/>
+          </a:ln>
+          <a:extLst>
+            <a:ext uri="{909E8E84-426E-40DD-AFC4-6F175D3DCCD1}">
+              <a14:hiddenFill xmlns:a14="http://schemas.microsoft.com/office/drawing/2010/main">
+                <a:solidFill>
+                  <a:schemeClr val="accent1"/>
+                </a:solidFill>
+              </a14:hiddenFill>
+            </a:ext>
+            <a:ext uri="{91240B29-F687-4F45-9708-019B960494DF}">
+              <a14:hiddenLine xmlns:a14="http://schemas.microsoft.com/office/drawing/2010/main" w="9525">
+                <a:solidFill>
+                  <a:schemeClr val="tx1"/>
+                </a:solidFill>
+                <a:miter lim="800000"/>
+                <a:headEnd/>
+                <a:tailEnd/>
+              </a14:hiddenLine>
+            </a:ext>
+          </a:extLst>
+        </p:spPr>
+      </p:pic>
+    </p:spTree>
+    <p:extLst>
+      <p:ext uri="{BB962C8B-B14F-4D97-AF65-F5344CB8AC3E}">
+        <p14:creationId xmlns:p14="http://schemas.microsoft.com/office/powerpoint/2010/main" val="3004235530"/>
+      </p:ext>
+    </p:extLst>
+  </p:cSld>
+  <p:clrMapOvr>
+    <a:masterClrMapping/>
+  </p:clrMapOvr>
+  <p:timing>
+    <p:tnLst>
+      <p:par>
+        <p:cTn id="1" dur="indefinite" restart="never" nodeType="tmRoot"/>
+      </p:par>
+    </p:tnLst>
+  </p:timing>
 </p:sld>
 </file>
 

</xml_diff>